<commit_message>
Update DG to describe implementation of search feature (#93)
</commit_message>
<xml_diff>
--- a/docs/diagrams/ArchitectureDiagram.pptx
+++ b/docs/diagrams/ArchitectureDiagram.pptx
@@ -107,6 +107,22 @@
       </a:defRPr>
     </a:lvl9pPr>
   </p:defaultTextStyle>
+  <p:extLst>
+    <p:ext uri="{EFAFB233-063F-42B5-8137-9DF3F51BA10A}">
+      <p15:sldGuideLst xmlns:p15="http://schemas.microsoft.com/office/powerpoint/2012/main">
+        <p15:guide id="1" orient="horz" pos="1488">
+          <p15:clr>
+            <a:srgbClr val="A4A3A4"/>
+          </p15:clr>
+        </p15:guide>
+        <p15:guide id="2" pos="2880">
+          <p15:clr>
+            <a:srgbClr val="A4A3A4"/>
+          </p15:clr>
+        </p15:guide>
+      </p15:sldGuideLst>
+    </p:ext>
+  </p:extLst>
 </p:presentation>
 </file>
 
@@ -192,7 +208,7 @@
           <a:p>
             <a:fld id="{F5CC4B3F-88C1-4FFA-B1B6-F41C21DC6924}" type="datetimeFigureOut">
               <a:rPr lang="en-US" smtClean="0"/>
-              <a:t>10/16/2016</a:t>
+              <a:t>3/22/2018</a:t>
             </a:fld>
             <a:endParaRPr lang="en-US"/>
           </a:p>
@@ -641,7 +657,7 @@
           <a:p>
             <a:fld id="{78C97017-6FC3-485B-9764-EAC9E56C1D49}" type="datetimeFigureOut">
               <a:rPr lang="en-US" smtClean="0"/>
-              <a:t>10/16/2016</a:t>
+              <a:t>3/22/2018</a:t>
             </a:fld>
             <a:endParaRPr lang="en-US"/>
           </a:p>
@@ -811,7 +827,7 @@
           <a:p>
             <a:fld id="{78C97017-6FC3-485B-9764-EAC9E56C1D49}" type="datetimeFigureOut">
               <a:rPr lang="en-US" smtClean="0"/>
-              <a:t>10/16/2016</a:t>
+              <a:t>3/22/2018</a:t>
             </a:fld>
             <a:endParaRPr lang="en-US"/>
           </a:p>
@@ -991,7 +1007,7 @@
           <a:p>
             <a:fld id="{78C97017-6FC3-485B-9764-EAC9E56C1D49}" type="datetimeFigureOut">
               <a:rPr lang="en-US" smtClean="0"/>
-              <a:t>10/16/2016</a:t>
+              <a:t>3/22/2018</a:t>
             </a:fld>
             <a:endParaRPr lang="en-US"/>
           </a:p>
@@ -1161,7 +1177,7 @@
           <a:p>
             <a:fld id="{78C97017-6FC3-485B-9764-EAC9E56C1D49}" type="datetimeFigureOut">
               <a:rPr lang="en-US" smtClean="0"/>
-              <a:t>10/16/2016</a:t>
+              <a:t>3/22/2018</a:t>
             </a:fld>
             <a:endParaRPr lang="en-US"/>
           </a:p>
@@ -1407,7 +1423,7 @@
           <a:p>
             <a:fld id="{78C97017-6FC3-485B-9764-EAC9E56C1D49}" type="datetimeFigureOut">
               <a:rPr lang="en-US" smtClean="0"/>
-              <a:t>10/16/2016</a:t>
+              <a:t>3/22/2018</a:t>
             </a:fld>
             <a:endParaRPr lang="en-US"/>
           </a:p>
@@ -1695,7 +1711,7 @@
           <a:p>
             <a:fld id="{78C97017-6FC3-485B-9764-EAC9E56C1D49}" type="datetimeFigureOut">
               <a:rPr lang="en-US" smtClean="0"/>
-              <a:t>10/16/2016</a:t>
+              <a:t>3/22/2018</a:t>
             </a:fld>
             <a:endParaRPr lang="en-US"/>
           </a:p>
@@ -2117,7 +2133,7 @@
           <a:p>
             <a:fld id="{78C97017-6FC3-485B-9764-EAC9E56C1D49}" type="datetimeFigureOut">
               <a:rPr lang="en-US" smtClean="0"/>
-              <a:t>10/16/2016</a:t>
+              <a:t>3/22/2018</a:t>
             </a:fld>
             <a:endParaRPr lang="en-US"/>
           </a:p>
@@ -2235,7 +2251,7 @@
           <a:p>
             <a:fld id="{78C97017-6FC3-485B-9764-EAC9E56C1D49}" type="datetimeFigureOut">
               <a:rPr lang="en-US" smtClean="0"/>
-              <a:t>10/16/2016</a:t>
+              <a:t>3/22/2018</a:t>
             </a:fld>
             <a:endParaRPr lang="en-US"/>
           </a:p>
@@ -2330,7 +2346,7 @@
           <a:p>
             <a:fld id="{78C97017-6FC3-485B-9764-EAC9E56C1D49}" type="datetimeFigureOut">
               <a:rPr lang="en-US" smtClean="0"/>
-              <a:t>10/16/2016</a:t>
+              <a:t>3/22/2018</a:t>
             </a:fld>
             <a:endParaRPr lang="en-US"/>
           </a:p>
@@ -2607,7 +2623,7 @@
           <a:p>
             <a:fld id="{78C97017-6FC3-485B-9764-EAC9E56C1D49}" type="datetimeFigureOut">
               <a:rPr lang="en-US" smtClean="0"/>
-              <a:t>10/16/2016</a:t>
+              <a:t>3/22/2018</a:t>
             </a:fld>
             <a:endParaRPr lang="en-US"/>
           </a:p>
@@ -2860,7 +2876,7 @@
           <a:p>
             <a:fld id="{78C97017-6FC3-485B-9764-EAC9E56C1D49}" type="datetimeFigureOut">
               <a:rPr lang="en-US" smtClean="0"/>
-              <a:t>10/16/2016</a:t>
+              <a:t>3/22/2018</a:t>
             </a:fld>
             <a:endParaRPr lang="en-US"/>
           </a:p>
@@ -3073,7 +3089,7 @@
           <a:p>
             <a:fld id="{78C97017-6FC3-485B-9764-EAC9E56C1D49}" type="datetimeFigureOut">
               <a:rPr lang="en-US" smtClean="0"/>
-              <a:t>10/16/2016</a:t>
+              <a:t>3/22/2018</a:t>
             </a:fld>
             <a:endParaRPr lang="en-US"/>
           </a:p>
@@ -3457,7 +3473,7 @@
         <p:spPr>
           <a:xfrm>
             <a:off x="1636188" y="2057400"/>
-            <a:ext cx="5700181" cy="2667000"/>
+            <a:ext cx="5831412" cy="2743200"/>
           </a:xfrm>
           <a:prstGeom prst="roundRect">
             <a:avLst>
@@ -3511,7 +3527,7 @@
         <p:spPr>
           <a:xfrm flipH="1">
             <a:off x="1964269" y="2191178"/>
-            <a:ext cx="609602" cy="1294917"/>
+            <a:ext cx="609602" cy="1360717"/>
           </a:xfrm>
           <a:prstGeom prst="roundRect">
             <a:avLst/>
@@ -3569,7 +3585,7 @@
         </p:nvSpPr>
         <p:spPr>
           <a:xfrm>
-            <a:off x="3412069" y="2191178"/>
+            <a:off x="3087160" y="2191178"/>
             <a:ext cx="1295400" cy="552022"/>
           </a:xfrm>
           <a:prstGeom prst="roundRect">
@@ -3628,7 +3644,7 @@
         </p:nvSpPr>
         <p:spPr>
           <a:xfrm>
-            <a:off x="5164669" y="2191179"/>
+            <a:off x="4800599" y="2179673"/>
             <a:ext cx="1447800" cy="552022"/>
           </a:xfrm>
           <a:prstGeom prst="roundRect">
@@ -3691,7 +3707,7 @@
         </p:nvSpPr>
         <p:spPr>
           <a:xfrm>
-            <a:off x="3412069" y="3124200"/>
+            <a:off x="3087160" y="3098068"/>
             <a:ext cx="1295400" cy="723791"/>
           </a:xfrm>
           <a:prstGeom prst="roundRect">
@@ -3750,8 +3766,8 @@
         </p:nvSpPr>
         <p:spPr>
           <a:xfrm>
-            <a:off x="3217846" y="4131994"/>
-            <a:ext cx="2658531" cy="444640"/>
+            <a:off x="3217847" y="4236769"/>
+            <a:ext cx="2449528" cy="444640"/>
           </a:xfrm>
           <a:prstGeom prst="roundRect">
             <a:avLst/>
@@ -3815,7 +3831,7 @@
         </p:nvCxnSpPr>
         <p:spPr>
           <a:xfrm>
-            <a:off x="2573871" y="2467189"/>
+            <a:off x="2248962" y="2467189"/>
             <a:ext cx="838198" cy="0"/>
           </a:xfrm>
           <a:prstGeom prst="straightConnector1">
@@ -3852,7 +3868,7 @@
         <p:spPr>
           <a:xfrm>
             <a:off x="2569639" y="3276600"/>
-            <a:ext cx="838198" cy="0"/>
+            <a:ext cx="517521" cy="0"/>
           </a:xfrm>
           <a:prstGeom prst="straightConnector1">
             <a:avLst/>
@@ -3890,8 +3906,8 @@
         </p:nvCxnSpPr>
         <p:spPr>
           <a:xfrm>
-            <a:off x="4059769" y="2743200"/>
-            <a:ext cx="0" cy="381000"/>
+            <a:off x="3734860" y="2743200"/>
+            <a:ext cx="0" cy="354868"/>
           </a:xfrm>
           <a:prstGeom prst="straightConnector1">
             <a:avLst/>
@@ -3921,13 +3937,15 @@
       <p:cxnSp>
         <p:nvCxnSpPr>
           <p:cNvPr id="16" name="Straight Arrow Connector 15"/>
-          <p:cNvCxnSpPr/>
+          <p:cNvCxnSpPr>
+            <a:endCxn id="4" idx="1"/>
+          </p:cNvCxnSpPr>
           <p:nvPr/>
         </p:nvCxnSpPr>
         <p:spPr>
-          <a:xfrm>
-            <a:off x="4707469" y="2467189"/>
-            <a:ext cx="457200" cy="0"/>
+          <a:xfrm flipV="1">
+            <a:off x="4382560" y="2455684"/>
+            <a:ext cx="418039" cy="1980"/>
           </a:xfrm>
           <a:prstGeom prst="straightConnector1">
             <a:avLst/>
@@ -4042,13 +4060,15 @@
       <p:cxnSp>
         <p:nvCxnSpPr>
           <p:cNvPr id="34" name="Straight Arrow Connector 33"/>
-          <p:cNvCxnSpPr/>
+          <p:cNvCxnSpPr>
+            <a:endCxn id="35" idx="1"/>
+          </p:cNvCxnSpPr>
           <p:nvPr/>
         </p:nvCxnSpPr>
         <p:spPr>
-          <a:xfrm flipV="1">
-            <a:off x="6680199" y="2467190"/>
-            <a:ext cx="939801" cy="1"/>
+          <a:xfrm>
+            <a:off x="6248399" y="2467189"/>
+            <a:ext cx="1507070" cy="9311"/>
           </a:xfrm>
           <a:prstGeom prst="straightConnector1">
             <a:avLst/>
@@ -4086,7 +4106,7 @@
         </p:nvSpPr>
         <p:spPr>
           <a:xfrm>
-            <a:off x="7679269" y="2286000"/>
+            <a:off x="7755469" y="2286000"/>
             <a:ext cx="381000" cy="381000"/>
           </a:xfrm>
           <a:prstGeom prst="foldedCorner">
@@ -4134,7 +4154,7 @@
         </p:nvSpPr>
         <p:spPr>
           <a:xfrm>
-            <a:off x="7772400" y="2362200"/>
+            <a:off x="7848600" y="2362200"/>
             <a:ext cx="381000" cy="381000"/>
           </a:xfrm>
           <a:prstGeom prst="foldedCorner">
@@ -4182,7 +4202,7 @@
         </p:nvSpPr>
         <p:spPr>
           <a:xfrm>
-            <a:off x="2650069" y="1447800"/>
+            <a:off x="7562848" y="2952695"/>
             <a:ext cx="914400" cy="533400"/>
           </a:xfrm>
           <a:prstGeom prst="cloud">
@@ -4229,46 +4249,6 @@
           </a:p>
         </p:txBody>
       </p:sp>
-      <p:cxnSp>
-        <p:nvCxnSpPr>
-          <p:cNvPr id="52" name="Elbow Connector 51"/>
-          <p:cNvCxnSpPr>
-            <a:stCxn id="2" idx="0"/>
-            <a:endCxn id="51" idx="2"/>
-          </p:cNvCxnSpPr>
-          <p:nvPr/>
-        </p:nvCxnSpPr>
-        <p:spPr>
-          <a:xfrm rot="5400000" flipH="1" flipV="1">
-            <a:off x="2222648" y="1760922"/>
-            <a:ext cx="476678" cy="383835"/>
-          </a:xfrm>
-          <a:prstGeom prst="bentConnector2">
-            <a:avLst/>
-          </a:prstGeom>
-          <a:ln w="28575">
-            <a:solidFill>
-              <a:srgbClr val="00B050"/>
-            </a:solidFill>
-            <a:prstDash val="sysDot"/>
-            <a:tailEnd type="arrow"/>
-          </a:ln>
-        </p:spPr>
-        <p:style>
-          <a:lnRef idx="1">
-            <a:schemeClr val="accent1"/>
-          </a:lnRef>
-          <a:fillRef idx="0">
-            <a:schemeClr val="accent1"/>
-          </a:fillRef>
-          <a:effectRef idx="0">
-            <a:schemeClr val="accent1"/>
-          </a:effectRef>
-          <a:fontRef idx="minor">
-            <a:schemeClr val="tx1"/>
-          </a:fontRef>
-        </p:style>
-      </p:cxnSp>
       <p:sp>
         <p:nvSpPr>
           <p:cNvPr id="23" name="Rectangle 62"/>
@@ -4277,18 +4257,22 @@
         </p:nvSpPr>
         <p:spPr>
           <a:xfrm flipH="1">
-            <a:off x="1964269" y="3959459"/>
+            <a:off x="1964269" y="4077292"/>
             <a:ext cx="778931" cy="570908"/>
           </a:xfrm>
           <a:prstGeom prst="roundRect">
             <a:avLst/>
           </a:prstGeom>
           <a:solidFill>
-            <a:srgbClr val="C00000"/>
+            <a:schemeClr val="bg1">
+              <a:lumMod val="65000"/>
+            </a:schemeClr>
           </a:solidFill>
           <a:ln w="19050">
             <a:solidFill>
-              <a:srgbClr val="C00000"/>
+              <a:schemeClr val="bg1">
+                <a:lumMod val="65000"/>
+              </a:schemeClr>
             </a:solidFill>
           </a:ln>
           <a:effectLst/>
@@ -4336,7 +4320,7 @@
         </p:nvCxnSpPr>
         <p:spPr>
           <a:xfrm>
-            <a:off x="4945047" y="3750994"/>
+            <a:off x="4953000" y="3855769"/>
             <a:ext cx="0" cy="381000"/>
           </a:xfrm>
           <a:prstGeom prst="straightConnector1">
@@ -4375,7 +4359,7 @@
         </p:nvCxnSpPr>
         <p:spPr>
           <a:xfrm>
-            <a:off x="5097447" y="3761908"/>
+            <a:off x="5105400" y="3866683"/>
             <a:ext cx="0" cy="381000"/>
           </a:xfrm>
           <a:prstGeom prst="straightConnector1">
@@ -4414,7 +4398,7 @@
         </p:nvCxnSpPr>
         <p:spPr>
           <a:xfrm>
-            <a:off x="5249847" y="3750994"/>
+            <a:off x="5257800" y="3855769"/>
             <a:ext cx="0" cy="381000"/>
           </a:xfrm>
           <a:prstGeom prst="straightConnector1">
@@ -4455,7 +4439,7 @@
         </p:nvCxnSpPr>
         <p:spPr>
           <a:xfrm>
-            <a:off x="2743200" y="4244913"/>
+            <a:off x="2743200" y="4362746"/>
             <a:ext cx="249770" cy="0"/>
           </a:xfrm>
           <a:prstGeom prst="straightConnector1">
@@ -4463,7 +4447,9 @@
           </a:prstGeom>
           <a:ln w="28575">
             <a:solidFill>
-              <a:srgbClr val="C00000"/>
+              <a:schemeClr val="bg1">
+                <a:lumMod val="65000"/>
+              </a:schemeClr>
             </a:solidFill>
             <a:prstDash val="solid"/>
             <a:tailEnd type="arrow"/>
@@ -4492,7 +4478,7 @@
         </p:nvCxnSpPr>
         <p:spPr>
           <a:xfrm rot="13867188">
-            <a:off x="2743200" y="3755022"/>
+            <a:off x="2743200" y="3880924"/>
             <a:ext cx="0" cy="381000"/>
           </a:xfrm>
           <a:prstGeom prst="straightConnector1">
@@ -4500,7 +4486,9 @@
           </a:prstGeom>
           <a:ln w="28575">
             <a:solidFill>
-              <a:srgbClr val="C00000"/>
+              <a:schemeClr val="bg1">
+                <a:lumMod val="65000"/>
+              </a:schemeClr>
             </a:solidFill>
             <a:prstDash val="solid"/>
             <a:tailEnd type="arrow"/>
@@ -4529,7 +4517,7 @@
         </p:nvCxnSpPr>
         <p:spPr>
           <a:xfrm flipV="1">
-            <a:off x="2353734" y="3697061"/>
+            <a:off x="2353734" y="3812941"/>
             <a:ext cx="0" cy="301859"/>
           </a:xfrm>
           <a:prstGeom prst="straightConnector1">
@@ -4537,7 +4525,9 @@
           </a:prstGeom>
           <a:ln w="28575">
             <a:solidFill>
-              <a:srgbClr val="C00000"/>
+              <a:schemeClr val="bg1">
+                <a:lumMod val="65000"/>
+              </a:schemeClr>
             </a:solidFill>
             <a:prstDash val="solid"/>
             <a:tailEnd type="arrow"/>
@@ -4566,7 +4556,7 @@
         </p:nvSpPr>
         <p:spPr>
           <a:xfrm>
-            <a:off x="4936069" y="2909316"/>
+            <a:off x="6024547" y="3551895"/>
             <a:ext cx="1219201" cy="533400"/>
           </a:xfrm>
           <a:prstGeom prst="ellipse">
@@ -4624,7 +4614,7 @@
         </p:nvSpPr>
         <p:spPr>
           <a:xfrm>
-            <a:off x="5888569" y="3515641"/>
+            <a:off x="6048374" y="4191000"/>
             <a:ext cx="1219201" cy="533400"/>
           </a:xfrm>
           <a:prstGeom prst="ellipse">
@@ -4698,18 +4688,20 @@
         <p:nvCxnSpPr>
           <p:cNvPr id="40" name="Elbow Connector 39"/>
           <p:cNvCxnSpPr>
-            <a:stCxn id="26" idx="4"/>
+            <a:stCxn id="26" idx="2"/>
             <a:endCxn id="8" idx="3"/>
           </p:cNvCxnSpPr>
           <p:nvPr/>
         </p:nvCxnSpPr>
         <p:spPr>
-          <a:xfrm rot="5400000">
-            <a:off x="6034638" y="3890781"/>
-            <a:ext cx="305273" cy="621793"/>
-          </a:xfrm>
-          <a:prstGeom prst="bentConnector2">
-            <a:avLst/>
+          <a:xfrm rot="10800000" flipV="1">
+            <a:off x="5667376" y="4457699"/>
+            <a:ext cx="380999" cy="1389"/>
+          </a:xfrm>
+          <a:prstGeom prst="bentConnector3">
+            <a:avLst>
+              <a:gd name="adj1" fmla="val 50000"/>
+            </a:avLst>
           </a:prstGeom>
           <a:ln w="28575">
             <a:solidFill>
@@ -4738,16 +4730,16 @@
         <p:nvCxnSpPr>
           <p:cNvPr id="9" name="Elbow Connector 8"/>
           <p:cNvCxnSpPr>
-            <a:stCxn id="6" idx="4"/>
+            <a:stCxn id="6" idx="2"/>
           </p:cNvCxnSpPr>
           <p:nvPr/>
         </p:nvCxnSpPr>
         <p:spPr>
-          <a:xfrm rot="5400000">
-            <a:off x="5195574" y="3792812"/>
-            <a:ext cx="700192" cy="1"/>
-          </a:xfrm>
-          <a:prstGeom prst="bentConnector3">
+          <a:xfrm rot="10800000" flipV="1">
+            <a:off x="5543273" y="3818594"/>
+            <a:ext cx="481274" cy="533399"/>
+          </a:xfrm>
+          <a:prstGeom prst="bentConnector2">
             <a:avLst/>
           </a:prstGeom>
           <a:ln w="28575">
@@ -4756,6 +4748,102 @@
                 <a:lumMod val="75000"/>
               </a:schemeClr>
             </a:solidFill>
+          </a:ln>
+        </p:spPr>
+        <p:style>
+          <a:lnRef idx="1">
+            <a:schemeClr val="accent1"/>
+          </a:lnRef>
+          <a:fillRef idx="0">
+            <a:schemeClr val="accent1"/>
+          </a:fillRef>
+          <a:effectRef idx="0">
+            <a:schemeClr val="accent1"/>
+          </a:effectRef>
+          <a:fontRef idx="minor">
+            <a:schemeClr val="tx1"/>
+          </a:fontRef>
+        </p:style>
+      </p:cxnSp>
+      <p:sp>
+        <p:nvSpPr>
+          <p:cNvPr id="41" name="Rectangle 45"/>
+          <p:cNvSpPr/>
+          <p:nvPr/>
+        </p:nvSpPr>
+        <p:spPr>
+          <a:xfrm>
+            <a:off x="4800599" y="2952695"/>
+            <a:ext cx="1316570" cy="552022"/>
+          </a:xfrm>
+          <a:prstGeom prst="roundRect">
+            <a:avLst/>
+          </a:prstGeom>
+          <a:solidFill>
+            <a:schemeClr val="accent2"/>
+          </a:solidFill>
+          <a:ln w="19050">
+            <a:solidFill>
+              <a:schemeClr val="accent2"/>
+            </a:solidFill>
+          </a:ln>
+          <a:effectLst/>
+        </p:spPr>
+        <p:style>
+          <a:lnRef idx="1">
+            <a:schemeClr val="accent5"/>
+          </a:lnRef>
+          <a:fillRef idx="2">
+            <a:schemeClr val="accent5"/>
+          </a:fillRef>
+          <a:effectRef idx="1">
+            <a:schemeClr val="accent5"/>
+          </a:effectRef>
+          <a:fontRef idx="minor">
+            <a:schemeClr val="dk1"/>
+          </a:fontRef>
+        </p:style>
+        <p:txBody>
+          <a:bodyPr rtlCol="0" anchor="ctr"/>
+          <a:lstStyle/>
+          <a:p>
+            <a:pPr algn="ctr"/>
+            <a:r>
+              <a:rPr lang="en-US" sz="1600" dirty="0" smtClean="0">
+                <a:solidFill>
+                  <a:schemeClr val="bg1"/>
+                </a:solidFill>
+              </a:rPr>
+              <a:t>Network</a:t>
+            </a:r>
+            <a:endParaRPr lang="en-SG" sz="1600" dirty="0">
+              <a:solidFill>
+                <a:schemeClr val="bg1"/>
+              </a:solidFill>
+            </a:endParaRPr>
+          </a:p>
+        </p:txBody>
+      </p:sp>
+      <p:cxnSp>
+        <p:nvCxnSpPr>
+          <p:cNvPr id="42" name="Elbow Connector 41"/>
+          <p:cNvCxnSpPr/>
+          <p:nvPr/>
+        </p:nvCxnSpPr>
+        <p:spPr>
+          <a:xfrm>
+            <a:off x="6010274" y="3228975"/>
+            <a:ext cx="1559982" cy="0"/>
+          </a:xfrm>
+          <a:prstGeom prst="straightConnector1">
+            <a:avLst/>
+          </a:prstGeom>
+          <a:ln w="28575">
+            <a:solidFill>
+              <a:schemeClr val="accent2"/>
+            </a:solidFill>
+            <a:prstDash val="sysDot"/>
+            <a:tailEnd type="arrow"/>
           </a:ln>
         </p:spPr>
         <p:style>

</xml_diff>

<commit_message>
Update DevGuide and images
</commit_message>
<xml_diff>
--- a/docs/diagrams/ArchitectureDiagram.pptx
+++ b/docs/diagrams/ArchitectureDiagram.pptx
@@ -107,6 +107,22 @@
       </a:defRPr>
     </a:lvl9pPr>
   </p:defaultTextStyle>
+  <p:extLst>
+    <p:ext uri="{EFAFB233-063F-42B5-8137-9DF3F51BA10A}">
+      <p15:sldGuideLst xmlns:p15="http://schemas.microsoft.com/office/powerpoint/2012/main">
+        <p15:guide id="1" orient="horz" pos="1488">
+          <p15:clr>
+            <a:srgbClr val="A4A3A4"/>
+          </p15:clr>
+        </p15:guide>
+        <p15:guide id="2" pos="2880">
+          <p15:clr>
+            <a:srgbClr val="A4A3A4"/>
+          </p15:clr>
+        </p15:guide>
+      </p15:sldGuideLst>
+    </p:ext>
+  </p:extLst>
 </p:presentation>
 </file>
 
@@ -192,7 +208,7 @@
           <a:p>
             <a:fld id="{F5CC4B3F-88C1-4FFA-B1B6-F41C21DC6924}" type="datetimeFigureOut">
               <a:rPr lang="en-US" smtClean="0"/>
-              <a:t>10/16/2016</a:t>
+              <a:t>3/26/2018</a:t>
             </a:fld>
             <a:endParaRPr lang="en-US"/>
           </a:p>
@@ -256,38 +272,37 @@
           <a:p>
             <a:pPr lvl="0"/>
             <a:r>
-              <a:rPr lang="en-US" smtClean="0"/>
+              <a:rPr lang="en-US"/>
               <a:t>Click to edit Master text styles</a:t>
             </a:r>
           </a:p>
           <a:p>
             <a:pPr lvl="1"/>
             <a:r>
-              <a:rPr lang="en-US" smtClean="0"/>
+              <a:rPr lang="en-US"/>
               <a:t>Second level</a:t>
             </a:r>
           </a:p>
           <a:p>
             <a:pPr lvl="2"/>
             <a:r>
-              <a:rPr lang="en-US" smtClean="0"/>
+              <a:rPr lang="en-US"/>
               <a:t>Third level</a:t>
             </a:r>
           </a:p>
           <a:p>
             <a:pPr lvl="3"/>
             <a:r>
-              <a:rPr lang="en-US" smtClean="0"/>
+              <a:rPr lang="en-US"/>
               <a:t>Fourth level</a:t>
             </a:r>
           </a:p>
           <a:p>
             <a:pPr lvl="4"/>
             <a:r>
-              <a:rPr lang="en-US" smtClean="0"/>
+              <a:rPr lang="en-US"/>
               <a:t>Fifth level</a:t>
             </a:r>
-            <a:endParaRPr lang="en-US"/>
           </a:p>
         </p:txBody>
       </p:sp>
@@ -498,10 +513,9 @@
           <a:lstStyle/>
           <a:p>
             <a:r>
-              <a:rPr lang="en-US" smtClean="0"/>
+              <a:rPr lang="en-US"/>
               <a:t>Click to edit Master title style</a:t>
             </a:r>
-            <a:endParaRPr lang="en-US"/>
           </a:p>
         </p:txBody>
       </p:sp>
@@ -617,10 +631,9 @@
           </a:lstStyle>
           <a:p>
             <a:r>
-              <a:rPr lang="en-US" smtClean="0"/>
+              <a:rPr lang="en-US"/>
               <a:t>Click to edit Master subtitle style</a:t>
             </a:r>
-            <a:endParaRPr lang="en-US"/>
           </a:p>
         </p:txBody>
       </p:sp>
@@ -641,7 +654,7 @@
           <a:p>
             <a:fld id="{78C97017-6FC3-485B-9764-EAC9E56C1D49}" type="datetimeFigureOut">
               <a:rPr lang="en-US" smtClean="0"/>
-              <a:t>10/16/2016</a:t>
+              <a:t>3/26/2018</a:t>
             </a:fld>
             <a:endParaRPr lang="en-US"/>
           </a:p>
@@ -735,10 +748,9 @@
           <a:lstStyle/>
           <a:p>
             <a:r>
-              <a:rPr lang="en-US" smtClean="0"/>
+              <a:rPr lang="en-US"/>
               <a:t>Click to edit Master title style</a:t>
             </a:r>
-            <a:endParaRPr lang="en-US"/>
           </a:p>
         </p:txBody>
       </p:sp>
@@ -759,38 +771,37 @@
           <a:p>
             <a:pPr lvl="0"/>
             <a:r>
-              <a:rPr lang="en-US" smtClean="0"/>
+              <a:rPr lang="en-US"/>
               <a:t>Click to edit Master text styles</a:t>
             </a:r>
           </a:p>
           <a:p>
             <a:pPr lvl="1"/>
             <a:r>
-              <a:rPr lang="en-US" smtClean="0"/>
+              <a:rPr lang="en-US"/>
               <a:t>Second level</a:t>
             </a:r>
           </a:p>
           <a:p>
             <a:pPr lvl="2"/>
             <a:r>
-              <a:rPr lang="en-US" smtClean="0"/>
+              <a:rPr lang="en-US"/>
               <a:t>Third level</a:t>
             </a:r>
           </a:p>
           <a:p>
             <a:pPr lvl="3"/>
             <a:r>
-              <a:rPr lang="en-US" smtClean="0"/>
+              <a:rPr lang="en-US"/>
               <a:t>Fourth level</a:t>
             </a:r>
           </a:p>
           <a:p>
             <a:pPr lvl="4"/>
             <a:r>
-              <a:rPr lang="en-US" smtClean="0"/>
+              <a:rPr lang="en-US"/>
               <a:t>Fifth level</a:t>
             </a:r>
-            <a:endParaRPr lang="en-US"/>
           </a:p>
         </p:txBody>
       </p:sp>
@@ -811,7 +822,7 @@
           <a:p>
             <a:fld id="{78C97017-6FC3-485B-9764-EAC9E56C1D49}" type="datetimeFigureOut">
               <a:rPr lang="en-US" smtClean="0"/>
-              <a:t>10/16/2016</a:t>
+              <a:t>3/26/2018</a:t>
             </a:fld>
             <a:endParaRPr lang="en-US"/>
           </a:p>
@@ -910,10 +921,9 @@
           <a:lstStyle/>
           <a:p>
             <a:r>
-              <a:rPr lang="en-US" smtClean="0"/>
+              <a:rPr lang="en-US"/>
               <a:t>Click to edit Master title style</a:t>
             </a:r>
-            <a:endParaRPr lang="en-US"/>
           </a:p>
         </p:txBody>
       </p:sp>
@@ -939,38 +949,37 @@
           <a:p>
             <a:pPr lvl="0"/>
             <a:r>
-              <a:rPr lang="en-US" smtClean="0"/>
+              <a:rPr lang="en-US"/>
               <a:t>Click to edit Master text styles</a:t>
             </a:r>
           </a:p>
           <a:p>
             <a:pPr lvl="1"/>
             <a:r>
-              <a:rPr lang="en-US" smtClean="0"/>
+              <a:rPr lang="en-US"/>
               <a:t>Second level</a:t>
             </a:r>
           </a:p>
           <a:p>
             <a:pPr lvl="2"/>
             <a:r>
-              <a:rPr lang="en-US" smtClean="0"/>
+              <a:rPr lang="en-US"/>
               <a:t>Third level</a:t>
             </a:r>
           </a:p>
           <a:p>
             <a:pPr lvl="3"/>
             <a:r>
-              <a:rPr lang="en-US" smtClean="0"/>
+              <a:rPr lang="en-US"/>
               <a:t>Fourth level</a:t>
             </a:r>
           </a:p>
           <a:p>
             <a:pPr lvl="4"/>
             <a:r>
-              <a:rPr lang="en-US" smtClean="0"/>
+              <a:rPr lang="en-US"/>
               <a:t>Fifth level</a:t>
             </a:r>
-            <a:endParaRPr lang="en-US"/>
           </a:p>
         </p:txBody>
       </p:sp>
@@ -991,7 +1000,7 @@
           <a:p>
             <a:fld id="{78C97017-6FC3-485B-9764-EAC9E56C1D49}" type="datetimeFigureOut">
               <a:rPr lang="en-US" smtClean="0"/>
-              <a:t>10/16/2016</a:t>
+              <a:t>3/26/2018</a:t>
             </a:fld>
             <a:endParaRPr lang="en-US"/>
           </a:p>
@@ -1085,10 +1094,9 @@
           <a:lstStyle/>
           <a:p>
             <a:r>
-              <a:rPr lang="en-US" smtClean="0"/>
+              <a:rPr lang="en-US"/>
               <a:t>Click to edit Master title style</a:t>
             </a:r>
-            <a:endParaRPr lang="en-US"/>
           </a:p>
         </p:txBody>
       </p:sp>
@@ -1109,38 +1117,37 @@
           <a:p>
             <a:pPr lvl="0"/>
             <a:r>
-              <a:rPr lang="en-US" smtClean="0"/>
+              <a:rPr lang="en-US"/>
               <a:t>Click to edit Master text styles</a:t>
             </a:r>
           </a:p>
           <a:p>
             <a:pPr lvl="1"/>
             <a:r>
-              <a:rPr lang="en-US" smtClean="0"/>
+              <a:rPr lang="en-US"/>
               <a:t>Second level</a:t>
             </a:r>
           </a:p>
           <a:p>
             <a:pPr lvl="2"/>
             <a:r>
-              <a:rPr lang="en-US" smtClean="0"/>
+              <a:rPr lang="en-US"/>
               <a:t>Third level</a:t>
             </a:r>
           </a:p>
           <a:p>
             <a:pPr lvl="3"/>
             <a:r>
-              <a:rPr lang="en-US" smtClean="0"/>
+              <a:rPr lang="en-US"/>
               <a:t>Fourth level</a:t>
             </a:r>
           </a:p>
           <a:p>
             <a:pPr lvl="4"/>
             <a:r>
-              <a:rPr lang="en-US" smtClean="0"/>
+              <a:rPr lang="en-US"/>
               <a:t>Fifth level</a:t>
             </a:r>
-            <a:endParaRPr lang="en-US"/>
           </a:p>
         </p:txBody>
       </p:sp>
@@ -1161,7 +1168,7 @@
           <a:p>
             <a:fld id="{78C97017-6FC3-485B-9764-EAC9E56C1D49}" type="datetimeFigureOut">
               <a:rPr lang="en-US" smtClean="0"/>
-              <a:t>10/16/2016</a:t>
+              <a:t>3/26/2018</a:t>
             </a:fld>
             <a:endParaRPr lang="en-US"/>
           </a:p>
@@ -1264,10 +1271,9 @@
           </a:lstStyle>
           <a:p>
             <a:r>
-              <a:rPr lang="en-US" smtClean="0"/>
+              <a:rPr lang="en-US"/>
               <a:t>Click to edit Master title style</a:t>
             </a:r>
-            <a:endParaRPr lang="en-US"/>
           </a:p>
         </p:txBody>
       </p:sp>
@@ -1384,7 +1390,7 @@
           <a:p>
             <a:pPr lvl="0"/>
             <a:r>
-              <a:rPr lang="en-US" smtClean="0"/>
+              <a:rPr lang="en-US"/>
               <a:t>Click to edit Master text styles</a:t>
             </a:r>
           </a:p>
@@ -1407,7 +1413,7 @@
           <a:p>
             <a:fld id="{78C97017-6FC3-485B-9764-EAC9E56C1D49}" type="datetimeFigureOut">
               <a:rPr lang="en-US" smtClean="0"/>
-              <a:t>10/16/2016</a:t>
+              <a:t>3/26/2018</a:t>
             </a:fld>
             <a:endParaRPr lang="en-US"/>
           </a:p>
@@ -1501,10 +1507,9 @@
           <a:lstStyle/>
           <a:p>
             <a:r>
-              <a:rPr lang="en-US" smtClean="0"/>
+              <a:rPr lang="en-US"/>
               <a:t>Click to edit Master title style</a:t>
             </a:r>
-            <a:endParaRPr lang="en-US"/>
           </a:p>
         </p:txBody>
       </p:sp>
@@ -1558,38 +1563,37 @@
           <a:p>
             <a:pPr lvl="0"/>
             <a:r>
-              <a:rPr lang="en-US" smtClean="0"/>
+              <a:rPr lang="en-US"/>
               <a:t>Click to edit Master text styles</a:t>
             </a:r>
           </a:p>
           <a:p>
             <a:pPr lvl="1"/>
             <a:r>
-              <a:rPr lang="en-US" smtClean="0"/>
+              <a:rPr lang="en-US"/>
               <a:t>Second level</a:t>
             </a:r>
           </a:p>
           <a:p>
             <a:pPr lvl="2"/>
             <a:r>
-              <a:rPr lang="en-US" smtClean="0"/>
+              <a:rPr lang="en-US"/>
               <a:t>Third level</a:t>
             </a:r>
           </a:p>
           <a:p>
             <a:pPr lvl="3"/>
             <a:r>
-              <a:rPr lang="en-US" smtClean="0"/>
+              <a:rPr lang="en-US"/>
               <a:t>Fourth level</a:t>
             </a:r>
           </a:p>
           <a:p>
             <a:pPr lvl="4"/>
             <a:r>
-              <a:rPr lang="en-US" smtClean="0"/>
+              <a:rPr lang="en-US"/>
               <a:t>Fifth level</a:t>
             </a:r>
-            <a:endParaRPr lang="en-US"/>
           </a:p>
         </p:txBody>
       </p:sp>
@@ -1643,38 +1647,37 @@
           <a:p>
             <a:pPr lvl="0"/>
             <a:r>
-              <a:rPr lang="en-US" smtClean="0"/>
+              <a:rPr lang="en-US"/>
               <a:t>Click to edit Master text styles</a:t>
             </a:r>
           </a:p>
           <a:p>
             <a:pPr lvl="1"/>
             <a:r>
-              <a:rPr lang="en-US" smtClean="0"/>
+              <a:rPr lang="en-US"/>
               <a:t>Second level</a:t>
             </a:r>
           </a:p>
           <a:p>
             <a:pPr lvl="2"/>
             <a:r>
-              <a:rPr lang="en-US" smtClean="0"/>
+              <a:rPr lang="en-US"/>
               <a:t>Third level</a:t>
             </a:r>
           </a:p>
           <a:p>
             <a:pPr lvl="3"/>
             <a:r>
-              <a:rPr lang="en-US" smtClean="0"/>
+              <a:rPr lang="en-US"/>
               <a:t>Fourth level</a:t>
             </a:r>
           </a:p>
           <a:p>
             <a:pPr lvl="4"/>
             <a:r>
-              <a:rPr lang="en-US" smtClean="0"/>
+              <a:rPr lang="en-US"/>
               <a:t>Fifth level</a:t>
             </a:r>
-            <a:endParaRPr lang="en-US"/>
           </a:p>
         </p:txBody>
       </p:sp>
@@ -1695,7 +1698,7 @@
           <a:p>
             <a:fld id="{78C97017-6FC3-485B-9764-EAC9E56C1D49}" type="datetimeFigureOut">
               <a:rPr lang="en-US" smtClean="0"/>
-              <a:t>10/16/2016</a:t>
+              <a:t>3/26/2018</a:t>
             </a:fld>
             <a:endParaRPr lang="en-US"/>
           </a:p>
@@ -1793,10 +1796,9 @@
           </a:lstStyle>
           <a:p>
             <a:r>
-              <a:rPr lang="en-US" smtClean="0"/>
+              <a:rPr lang="en-US"/>
               <a:t>Click to edit Master title style</a:t>
             </a:r>
-            <a:endParaRPr lang="en-US"/>
           </a:p>
         </p:txBody>
       </p:sp>
@@ -1859,7 +1861,7 @@
           <a:p>
             <a:pPr lvl="0"/>
             <a:r>
-              <a:rPr lang="en-US" smtClean="0"/>
+              <a:rPr lang="en-US"/>
               <a:t>Click to edit Master text styles</a:t>
             </a:r>
           </a:p>
@@ -1915,38 +1917,37 @@
           <a:p>
             <a:pPr lvl="0"/>
             <a:r>
-              <a:rPr lang="en-US" smtClean="0"/>
+              <a:rPr lang="en-US"/>
               <a:t>Click to edit Master text styles</a:t>
             </a:r>
           </a:p>
           <a:p>
             <a:pPr lvl="1"/>
             <a:r>
-              <a:rPr lang="en-US" smtClean="0"/>
+              <a:rPr lang="en-US"/>
               <a:t>Second level</a:t>
             </a:r>
           </a:p>
           <a:p>
             <a:pPr lvl="2"/>
             <a:r>
-              <a:rPr lang="en-US" smtClean="0"/>
+              <a:rPr lang="en-US"/>
               <a:t>Third level</a:t>
             </a:r>
           </a:p>
           <a:p>
             <a:pPr lvl="3"/>
             <a:r>
-              <a:rPr lang="en-US" smtClean="0"/>
+              <a:rPr lang="en-US"/>
               <a:t>Fourth level</a:t>
             </a:r>
           </a:p>
           <a:p>
             <a:pPr lvl="4"/>
             <a:r>
-              <a:rPr lang="en-US" smtClean="0"/>
+              <a:rPr lang="en-US"/>
               <a:t>Fifth level</a:t>
             </a:r>
-            <a:endParaRPr lang="en-US"/>
           </a:p>
         </p:txBody>
       </p:sp>
@@ -2009,7 +2010,7 @@
           <a:p>
             <a:pPr lvl="0"/>
             <a:r>
-              <a:rPr lang="en-US" smtClean="0"/>
+              <a:rPr lang="en-US"/>
               <a:t>Click to edit Master text styles</a:t>
             </a:r>
           </a:p>
@@ -2065,38 +2066,37 @@
           <a:p>
             <a:pPr lvl="0"/>
             <a:r>
-              <a:rPr lang="en-US" smtClean="0"/>
+              <a:rPr lang="en-US"/>
               <a:t>Click to edit Master text styles</a:t>
             </a:r>
           </a:p>
           <a:p>
             <a:pPr lvl="1"/>
             <a:r>
-              <a:rPr lang="en-US" smtClean="0"/>
+              <a:rPr lang="en-US"/>
               <a:t>Second level</a:t>
             </a:r>
           </a:p>
           <a:p>
             <a:pPr lvl="2"/>
             <a:r>
-              <a:rPr lang="en-US" smtClean="0"/>
+              <a:rPr lang="en-US"/>
               <a:t>Third level</a:t>
             </a:r>
           </a:p>
           <a:p>
             <a:pPr lvl="3"/>
             <a:r>
-              <a:rPr lang="en-US" smtClean="0"/>
+              <a:rPr lang="en-US"/>
               <a:t>Fourth level</a:t>
             </a:r>
           </a:p>
           <a:p>
             <a:pPr lvl="4"/>
             <a:r>
-              <a:rPr lang="en-US" smtClean="0"/>
+              <a:rPr lang="en-US"/>
               <a:t>Fifth level</a:t>
             </a:r>
-            <a:endParaRPr lang="en-US"/>
           </a:p>
         </p:txBody>
       </p:sp>
@@ -2117,7 +2117,7 @@
           <a:p>
             <a:fld id="{78C97017-6FC3-485B-9764-EAC9E56C1D49}" type="datetimeFigureOut">
               <a:rPr lang="en-US" smtClean="0"/>
-              <a:t>10/16/2016</a:t>
+              <a:t>3/26/2018</a:t>
             </a:fld>
             <a:endParaRPr lang="en-US"/>
           </a:p>
@@ -2211,10 +2211,9 @@
           <a:lstStyle/>
           <a:p>
             <a:r>
-              <a:rPr lang="en-US" smtClean="0"/>
+              <a:rPr lang="en-US"/>
               <a:t>Click to edit Master title style</a:t>
             </a:r>
-            <a:endParaRPr lang="en-US"/>
           </a:p>
         </p:txBody>
       </p:sp>
@@ -2235,7 +2234,7 @@
           <a:p>
             <a:fld id="{78C97017-6FC3-485B-9764-EAC9E56C1D49}" type="datetimeFigureOut">
               <a:rPr lang="en-US" smtClean="0"/>
-              <a:t>10/16/2016</a:t>
+              <a:t>3/26/2018</a:t>
             </a:fld>
             <a:endParaRPr lang="en-US"/>
           </a:p>
@@ -2330,7 +2329,7 @@
           <a:p>
             <a:fld id="{78C97017-6FC3-485B-9764-EAC9E56C1D49}" type="datetimeFigureOut">
               <a:rPr lang="en-US" smtClean="0"/>
-              <a:t>10/16/2016</a:t>
+              <a:t>3/26/2018</a:t>
             </a:fld>
             <a:endParaRPr lang="en-US"/>
           </a:p>
@@ -2433,10 +2432,9 @@
           </a:lstStyle>
           <a:p>
             <a:r>
-              <a:rPr lang="en-US" smtClean="0"/>
+              <a:rPr lang="en-US"/>
               <a:t>Click to edit Master title style</a:t>
             </a:r>
-            <a:endParaRPr lang="en-US"/>
           </a:p>
         </p:txBody>
       </p:sp>
@@ -2490,38 +2488,37 @@
           <a:p>
             <a:pPr lvl="0"/>
             <a:r>
-              <a:rPr lang="en-US" smtClean="0"/>
+              <a:rPr lang="en-US"/>
               <a:t>Click to edit Master text styles</a:t>
             </a:r>
           </a:p>
           <a:p>
             <a:pPr lvl="1"/>
             <a:r>
-              <a:rPr lang="en-US" smtClean="0"/>
+              <a:rPr lang="en-US"/>
               <a:t>Second level</a:t>
             </a:r>
           </a:p>
           <a:p>
             <a:pPr lvl="2"/>
             <a:r>
-              <a:rPr lang="en-US" smtClean="0"/>
+              <a:rPr lang="en-US"/>
               <a:t>Third level</a:t>
             </a:r>
           </a:p>
           <a:p>
             <a:pPr lvl="3"/>
             <a:r>
-              <a:rPr lang="en-US" smtClean="0"/>
+              <a:rPr lang="en-US"/>
               <a:t>Fourth level</a:t>
             </a:r>
           </a:p>
           <a:p>
             <a:pPr lvl="4"/>
             <a:r>
-              <a:rPr lang="en-US" smtClean="0"/>
+              <a:rPr lang="en-US"/>
               <a:t>Fifth level</a:t>
             </a:r>
-            <a:endParaRPr lang="en-US"/>
           </a:p>
         </p:txBody>
       </p:sp>
@@ -2584,7 +2581,7 @@
           <a:p>
             <a:pPr lvl="0"/>
             <a:r>
-              <a:rPr lang="en-US" smtClean="0"/>
+              <a:rPr lang="en-US"/>
               <a:t>Click to edit Master text styles</a:t>
             </a:r>
           </a:p>
@@ -2607,7 +2604,7 @@
           <a:p>
             <a:fld id="{78C97017-6FC3-485B-9764-EAC9E56C1D49}" type="datetimeFigureOut">
               <a:rPr lang="en-US" smtClean="0"/>
-              <a:t>10/16/2016</a:t>
+              <a:t>3/26/2018</a:t>
             </a:fld>
             <a:endParaRPr lang="en-US"/>
           </a:p>
@@ -2710,10 +2707,9 @@
           </a:lstStyle>
           <a:p>
             <a:r>
-              <a:rPr lang="en-US" smtClean="0"/>
+              <a:rPr lang="en-US"/>
               <a:t>Click to edit Master title style</a:t>
             </a:r>
-            <a:endParaRPr lang="en-US"/>
           </a:p>
         </p:txBody>
       </p:sp>
@@ -2837,7 +2833,7 @@
           <a:p>
             <a:pPr lvl="0"/>
             <a:r>
-              <a:rPr lang="en-US" smtClean="0"/>
+              <a:rPr lang="en-US"/>
               <a:t>Click to edit Master text styles</a:t>
             </a:r>
           </a:p>
@@ -2860,7 +2856,7 @@
           <a:p>
             <a:fld id="{78C97017-6FC3-485B-9764-EAC9E56C1D49}" type="datetimeFigureOut">
               <a:rPr lang="en-US" smtClean="0"/>
-              <a:t>10/16/2016</a:t>
+              <a:t>3/26/2018</a:t>
             </a:fld>
             <a:endParaRPr lang="en-US"/>
           </a:p>
@@ -2969,10 +2965,9 @@
           <a:lstStyle/>
           <a:p>
             <a:r>
-              <a:rPr lang="en-US" smtClean="0"/>
+              <a:rPr lang="en-US"/>
               <a:t>Click to edit Master title style</a:t>
             </a:r>
-            <a:endParaRPr lang="en-US"/>
           </a:p>
         </p:txBody>
       </p:sp>
@@ -3003,38 +2998,37 @@
           <a:p>
             <a:pPr lvl="0"/>
             <a:r>
-              <a:rPr lang="en-US" smtClean="0"/>
+              <a:rPr lang="en-US"/>
               <a:t>Click to edit Master text styles</a:t>
             </a:r>
           </a:p>
           <a:p>
             <a:pPr lvl="1"/>
             <a:r>
-              <a:rPr lang="en-US" smtClean="0"/>
+              <a:rPr lang="en-US"/>
               <a:t>Second level</a:t>
             </a:r>
           </a:p>
           <a:p>
             <a:pPr lvl="2"/>
             <a:r>
-              <a:rPr lang="en-US" smtClean="0"/>
+              <a:rPr lang="en-US"/>
               <a:t>Third level</a:t>
             </a:r>
           </a:p>
           <a:p>
             <a:pPr lvl="3"/>
             <a:r>
-              <a:rPr lang="en-US" smtClean="0"/>
+              <a:rPr lang="en-US"/>
               <a:t>Fourth level</a:t>
             </a:r>
           </a:p>
           <a:p>
             <a:pPr lvl="4"/>
             <a:r>
-              <a:rPr lang="en-US" smtClean="0"/>
+              <a:rPr lang="en-US"/>
               <a:t>Fifth level</a:t>
             </a:r>
-            <a:endParaRPr lang="en-US"/>
           </a:p>
         </p:txBody>
       </p:sp>
@@ -3073,7 +3067,7 @@
           <a:p>
             <a:fld id="{78C97017-6FC3-485B-9764-EAC9E56C1D49}" type="datetimeFigureOut">
               <a:rPr lang="en-US" smtClean="0"/>
-              <a:t>10/16/2016</a:t>
+              <a:t>3/26/2018</a:t>
             </a:fld>
             <a:endParaRPr lang="en-US"/>
           </a:p>
@@ -3456,8 +3450,8 @@
         </p:nvSpPr>
         <p:spPr>
           <a:xfrm>
-            <a:off x="1636188" y="2057400"/>
-            <a:ext cx="5700181" cy="2667000"/>
+            <a:off x="1026588" y="2057400"/>
+            <a:ext cx="6807194" cy="2667000"/>
           </a:xfrm>
           <a:prstGeom prst="roundRect">
             <a:avLst>
@@ -3510,8 +3504,8 @@
         </p:nvSpPr>
         <p:spPr>
           <a:xfrm flipH="1">
-            <a:off x="1964269" y="2191178"/>
-            <a:ext cx="609602" cy="1294917"/>
+            <a:off x="2412786" y="2191178"/>
+            <a:ext cx="658497" cy="1294917"/>
           </a:xfrm>
           <a:prstGeom prst="roundRect">
             <a:avLst/>
@@ -3546,7 +3540,7 @@
           <a:p>
             <a:pPr algn="ctr"/>
             <a:r>
-              <a:rPr lang="en-US" sz="1600" dirty="0" smtClean="0">
+              <a:rPr lang="en-US" sz="1600" dirty="0">
                 <a:solidFill>
                   <a:schemeClr val="bg1"/>
                 </a:solidFill>
@@ -3569,8 +3563,8 @@
         </p:nvSpPr>
         <p:spPr>
           <a:xfrm>
-            <a:off x="3412069" y="2191178"/>
-            <a:ext cx="1295400" cy="552022"/>
+            <a:off x="3805580" y="2191178"/>
+            <a:ext cx="1399301" cy="552022"/>
           </a:xfrm>
           <a:prstGeom prst="roundRect">
             <a:avLst/>
@@ -3605,7 +3599,7 @@
           <a:p>
             <a:pPr algn="ctr"/>
             <a:r>
-              <a:rPr lang="en-US" sz="1600" dirty="0" smtClean="0">
+              <a:rPr lang="en-US" sz="1600" dirty="0">
                 <a:solidFill>
                   <a:schemeClr val="bg1"/>
                 </a:solidFill>
@@ -3628,8 +3622,8 @@
         </p:nvSpPr>
         <p:spPr>
           <a:xfrm>
-            <a:off x="5164669" y="2191179"/>
-            <a:ext cx="1447800" cy="552022"/>
+            <a:off x="5545956" y="2191179"/>
+            <a:ext cx="1563925" cy="552022"/>
           </a:xfrm>
           <a:prstGeom prst="roundRect">
             <a:avLst/>
@@ -3668,7 +3662,7 @@
           <a:p>
             <a:pPr algn="ctr"/>
             <a:r>
-              <a:rPr lang="en-US" sz="1600" dirty="0" smtClean="0">
+              <a:rPr lang="en-US" sz="1600" dirty="0">
                 <a:solidFill>
                   <a:schemeClr val="bg1"/>
                 </a:solidFill>
@@ -3691,8 +3685,8 @@
         </p:nvSpPr>
         <p:spPr>
           <a:xfrm>
-            <a:off x="3412069" y="3124200"/>
-            <a:ext cx="1295400" cy="723791"/>
+            <a:off x="3805580" y="3124200"/>
+            <a:ext cx="1399301" cy="723791"/>
           </a:xfrm>
           <a:prstGeom prst="roundRect">
             <a:avLst/>
@@ -3727,7 +3721,7 @@
           <a:p>
             <a:pPr algn="ctr"/>
             <a:r>
-              <a:rPr lang="en-US" sz="1600" dirty="0" smtClean="0">
+              <a:rPr lang="en-US" sz="1600" dirty="0">
                 <a:solidFill>
                   <a:schemeClr val="bg1"/>
                 </a:solidFill>
@@ -3750,8 +3744,8 @@
         </p:nvSpPr>
         <p:spPr>
           <a:xfrm>
-            <a:off x="3217846" y="4131994"/>
-            <a:ext cx="2658531" cy="444640"/>
+            <a:off x="3502024" y="4131994"/>
+            <a:ext cx="2871766" cy="444640"/>
           </a:xfrm>
           <a:prstGeom prst="roundRect">
             <a:avLst/>
@@ -3815,8 +3809,8 @@
         </p:nvCxnSpPr>
         <p:spPr>
           <a:xfrm>
-            <a:off x="2573871" y="2467189"/>
-            <a:ext cx="838198" cy="0"/>
+            <a:off x="3071283" y="2467189"/>
+            <a:ext cx="734297" cy="0"/>
           </a:xfrm>
           <a:prstGeom prst="straightConnector1">
             <a:avLst/>
@@ -3846,13 +3840,15 @@
       <p:cxnSp>
         <p:nvCxnSpPr>
           <p:cNvPr id="12" name="Straight Arrow Connector 11"/>
-          <p:cNvCxnSpPr/>
+          <p:cNvCxnSpPr>
+            <a:cxnSpLocks/>
+          </p:cNvCxnSpPr>
           <p:nvPr/>
         </p:nvCxnSpPr>
         <p:spPr>
           <a:xfrm>
-            <a:off x="2569639" y="3276600"/>
-            <a:ext cx="838198" cy="0"/>
+            <a:off x="2999821" y="3276600"/>
+            <a:ext cx="905428" cy="0"/>
           </a:xfrm>
           <a:prstGeom prst="straightConnector1">
             <a:avLst/>
@@ -3890,7 +3886,7 @@
         </p:nvCxnSpPr>
         <p:spPr>
           <a:xfrm>
-            <a:off x="4059769" y="2743200"/>
+            <a:off x="4505231" y="2743200"/>
             <a:ext cx="0" cy="381000"/>
           </a:xfrm>
           <a:prstGeom prst="straightConnector1">
@@ -3921,13 +3917,15 @@
       <p:cxnSp>
         <p:nvCxnSpPr>
           <p:cNvPr id="16" name="Straight Arrow Connector 15"/>
-          <p:cNvCxnSpPr/>
+          <p:cNvCxnSpPr>
+            <a:cxnSpLocks/>
+          </p:cNvCxnSpPr>
           <p:nvPr/>
         </p:nvCxnSpPr>
         <p:spPr>
           <a:xfrm>
-            <a:off x="4707469" y="2467189"/>
-            <a:ext cx="457200" cy="0"/>
+            <a:off x="5168210" y="2467189"/>
+            <a:ext cx="493871" cy="0"/>
           </a:xfrm>
           <a:prstGeom prst="straightConnector1">
             <a:avLst/>
@@ -3962,7 +3960,7 @@
         </p:nvSpPr>
         <p:spPr>
           <a:xfrm>
-            <a:off x="1202269" y="2743200"/>
+            <a:off x="547214" y="2692379"/>
             <a:ext cx="381000" cy="381000"/>
           </a:xfrm>
           <a:prstGeom prst="smileyFace">
@@ -4005,13 +4003,15 @@
       <p:cxnSp>
         <p:nvCxnSpPr>
           <p:cNvPr id="32" name="Straight Arrow Connector 31"/>
-          <p:cNvCxnSpPr/>
+          <p:cNvCxnSpPr>
+            <a:cxnSpLocks/>
+          </p:cNvCxnSpPr>
           <p:nvPr/>
         </p:nvCxnSpPr>
         <p:spPr>
-          <a:xfrm flipV="1">
-            <a:off x="1636188" y="2939996"/>
-            <a:ext cx="273050" cy="1"/>
+          <a:xfrm>
+            <a:off x="978838" y="2882879"/>
+            <a:ext cx="1255181" cy="1"/>
           </a:xfrm>
           <a:prstGeom prst="straightConnector1">
             <a:avLst/>
@@ -4042,13 +4042,15 @@
       <p:cxnSp>
         <p:nvCxnSpPr>
           <p:cNvPr id="34" name="Straight Arrow Connector 33"/>
-          <p:cNvCxnSpPr/>
+          <p:cNvCxnSpPr>
+            <a:cxnSpLocks/>
+          </p:cNvCxnSpPr>
           <p:nvPr/>
         </p:nvCxnSpPr>
         <p:spPr>
-          <a:xfrm flipV="1">
-            <a:off x="6680199" y="2467190"/>
-            <a:ext cx="939801" cy="1"/>
+          <a:xfrm>
+            <a:off x="7102231" y="2467189"/>
+            <a:ext cx="1015181" cy="2"/>
           </a:xfrm>
           <a:prstGeom prst="straightConnector1">
             <a:avLst/>
@@ -4086,8 +4088,8 @@
         </p:nvSpPr>
         <p:spPr>
           <a:xfrm>
-            <a:off x="7679269" y="2286000"/>
-            <a:ext cx="381000" cy="381000"/>
+            <a:off x="8146122" y="2286000"/>
+            <a:ext cx="411559" cy="381000"/>
           </a:xfrm>
           <a:prstGeom prst="foldedCorner">
             <a:avLst/>
@@ -4134,8 +4136,8 @@
         </p:nvSpPr>
         <p:spPr>
           <a:xfrm>
-            <a:off x="7772400" y="2362200"/>
-            <a:ext cx="381000" cy="381000"/>
+            <a:off x="8239253" y="2362200"/>
+            <a:ext cx="411559" cy="381000"/>
           </a:xfrm>
           <a:prstGeom prst="foldedCorner">
             <a:avLst/>
@@ -4176,109 +4178,14 @@
       </p:sp>
       <p:sp>
         <p:nvSpPr>
-          <p:cNvPr id="51" name="Cloud 50"/>
-          <p:cNvSpPr/>
-          <p:nvPr/>
-        </p:nvSpPr>
-        <p:spPr>
-          <a:xfrm>
-            <a:off x="2650069" y="1447800"/>
-            <a:ext cx="914400" cy="533400"/>
-          </a:xfrm>
-          <a:prstGeom prst="cloud">
-            <a:avLst/>
-          </a:prstGeom>
-          <a:solidFill>
-            <a:schemeClr val="bg1"/>
-          </a:solidFill>
-          <a:ln>
-            <a:solidFill>
-              <a:schemeClr val="tx1"/>
-            </a:solidFill>
-          </a:ln>
-        </p:spPr>
-        <p:style>
-          <a:lnRef idx="2">
-            <a:schemeClr val="accent1">
-              <a:shade val="50000"/>
-            </a:schemeClr>
-          </a:lnRef>
-          <a:fillRef idx="1">
-            <a:schemeClr val="accent1"/>
-          </a:fillRef>
-          <a:effectRef idx="0">
-            <a:schemeClr val="accent1"/>
-          </a:effectRef>
-          <a:fontRef idx="minor">
-            <a:schemeClr val="lt1"/>
-          </a:fontRef>
-        </p:style>
-        <p:txBody>
-          <a:bodyPr rtlCol="0" anchor="ctr"/>
-          <a:lstStyle/>
-          <a:p>
-            <a:pPr algn="ctr"/>
-            <a:r>
-              <a:rPr lang="en-US" sz="1400" dirty="0">
-                <a:solidFill>
-                  <a:schemeClr val="tx1"/>
-                </a:solidFill>
-              </a:rPr>
-              <a:t>Web</a:t>
-            </a:r>
-          </a:p>
-        </p:txBody>
-      </p:sp>
-      <p:cxnSp>
-        <p:nvCxnSpPr>
-          <p:cNvPr id="52" name="Elbow Connector 51"/>
-          <p:cNvCxnSpPr>
-            <a:stCxn id="2" idx="0"/>
-            <a:endCxn id="51" idx="2"/>
-          </p:cNvCxnSpPr>
-          <p:nvPr/>
-        </p:nvCxnSpPr>
-        <p:spPr>
-          <a:xfrm rot="5400000" flipH="1" flipV="1">
-            <a:off x="2222648" y="1760922"/>
-            <a:ext cx="476678" cy="383835"/>
-          </a:xfrm>
-          <a:prstGeom prst="bentConnector2">
-            <a:avLst/>
-          </a:prstGeom>
-          <a:ln w="28575">
-            <a:solidFill>
-              <a:srgbClr val="00B050"/>
-            </a:solidFill>
-            <a:prstDash val="sysDot"/>
-            <a:tailEnd type="arrow"/>
-          </a:ln>
-        </p:spPr>
-        <p:style>
-          <a:lnRef idx="1">
-            <a:schemeClr val="accent1"/>
-          </a:lnRef>
-          <a:fillRef idx="0">
-            <a:schemeClr val="accent1"/>
-          </a:fillRef>
-          <a:effectRef idx="0">
-            <a:schemeClr val="accent1"/>
-          </a:effectRef>
-          <a:fontRef idx="minor">
-            <a:schemeClr val="tx1"/>
-          </a:fontRef>
-        </p:style>
-      </p:cxnSp>
-      <p:sp>
-        <p:nvSpPr>
           <p:cNvPr id="23" name="Rectangle 62"/>
           <p:cNvSpPr/>
           <p:nvPr/>
         </p:nvSpPr>
         <p:spPr>
           <a:xfrm flipH="1">
-            <a:off x="1964269" y="3959459"/>
-            <a:ext cx="778931" cy="570908"/>
+            <a:off x="1200625" y="4049041"/>
+            <a:ext cx="841407" cy="570908"/>
           </a:xfrm>
           <a:prstGeom prst="roundRect">
             <a:avLst/>
@@ -4313,7 +4220,7 @@
           <a:p>
             <a:pPr algn="ctr"/>
             <a:r>
-              <a:rPr lang="en-US" sz="1600" dirty="0" smtClean="0">
+              <a:rPr lang="en-US" sz="1600" dirty="0">
                 <a:solidFill>
                   <a:schemeClr val="bg1"/>
                 </a:solidFill>
@@ -4331,12 +4238,14 @@
       <p:cxnSp>
         <p:nvCxnSpPr>
           <p:cNvPr id="30" name="Straight Arrow Connector 29"/>
-          <p:cNvCxnSpPr/>
+          <p:cNvCxnSpPr>
+            <a:cxnSpLocks/>
+          </p:cNvCxnSpPr>
           <p:nvPr/>
         </p:nvCxnSpPr>
         <p:spPr>
           <a:xfrm>
-            <a:off x="4945047" y="3750994"/>
+            <a:off x="5442459" y="3750994"/>
             <a:ext cx="0" cy="381000"/>
           </a:xfrm>
           <a:prstGeom prst="straightConnector1">
@@ -4370,12 +4279,14 @@
       <p:cxnSp>
         <p:nvCxnSpPr>
           <p:cNvPr id="31" name="Straight Arrow Connector 30"/>
-          <p:cNvCxnSpPr/>
+          <p:cNvCxnSpPr>
+            <a:cxnSpLocks/>
+          </p:cNvCxnSpPr>
           <p:nvPr/>
         </p:nvCxnSpPr>
         <p:spPr>
           <a:xfrm>
-            <a:off x="5097447" y="3761908"/>
+            <a:off x="5594859" y="3761908"/>
             <a:ext cx="0" cy="381000"/>
           </a:xfrm>
           <a:prstGeom prst="straightConnector1">
@@ -4409,12 +4320,14 @@
       <p:cxnSp>
         <p:nvCxnSpPr>
           <p:cNvPr id="33" name="Straight Arrow Connector 32"/>
-          <p:cNvCxnSpPr/>
+          <p:cNvCxnSpPr>
+            <a:cxnSpLocks/>
+          </p:cNvCxnSpPr>
           <p:nvPr/>
         </p:nvCxnSpPr>
         <p:spPr>
           <a:xfrm>
-            <a:off x="5249847" y="3750994"/>
+            <a:off x="5747259" y="3750994"/>
             <a:ext cx="0" cy="381000"/>
           </a:xfrm>
           <a:prstGeom prst="straightConnector1">
@@ -4449,21 +4362,23 @@
         <p:nvCxnSpPr>
           <p:cNvPr id="37" name="Straight Arrow Connector 36"/>
           <p:cNvCxnSpPr>
-            <a:stCxn id="23" idx="1"/>
+            <a:cxnSpLocks/>
           </p:cNvCxnSpPr>
           <p:nvPr/>
         </p:nvCxnSpPr>
         <p:spPr>
           <a:xfrm>
-            <a:off x="2743200" y="4244913"/>
-            <a:ext cx="249770" cy="0"/>
+            <a:off x="3221293" y="4343428"/>
+            <a:ext cx="249771" cy="0"/>
           </a:xfrm>
           <a:prstGeom prst="straightConnector1">
             <a:avLst/>
           </a:prstGeom>
           <a:ln w="28575">
             <a:solidFill>
-              <a:srgbClr val="C00000"/>
+              <a:schemeClr val="bg2">
+                <a:lumMod val="25000"/>
+              </a:schemeClr>
             </a:solidFill>
             <a:prstDash val="solid"/>
             <a:tailEnd type="arrow"/>
@@ -4487,20 +4402,24 @@
       <p:cxnSp>
         <p:nvCxnSpPr>
           <p:cNvPr id="38" name="Straight Arrow Connector 37"/>
-          <p:cNvCxnSpPr/>
+          <p:cNvCxnSpPr>
+            <a:cxnSpLocks/>
+          </p:cNvCxnSpPr>
           <p:nvPr/>
         </p:nvCxnSpPr>
         <p:spPr>
-          <a:xfrm rot="13867188">
-            <a:off x="2743200" y="3755022"/>
-            <a:ext cx="0" cy="381000"/>
+          <a:xfrm flipV="1">
+            <a:off x="3192669" y="3804194"/>
+            <a:ext cx="480249" cy="267188"/>
           </a:xfrm>
           <a:prstGeom prst="straightConnector1">
             <a:avLst/>
           </a:prstGeom>
           <a:ln w="28575">
             <a:solidFill>
-              <a:srgbClr val="C00000"/>
+              <a:schemeClr val="bg2">
+                <a:lumMod val="25000"/>
+              </a:schemeClr>
             </a:solidFill>
             <a:prstDash val="solid"/>
             <a:tailEnd type="arrow"/>
@@ -4524,20 +4443,24 @@
       <p:cxnSp>
         <p:nvCxnSpPr>
           <p:cNvPr id="39" name="Straight Arrow Connector 38"/>
-          <p:cNvCxnSpPr/>
+          <p:cNvCxnSpPr>
+            <a:cxnSpLocks/>
+          </p:cNvCxnSpPr>
           <p:nvPr/>
         </p:nvCxnSpPr>
         <p:spPr>
           <a:xfrm flipV="1">
-            <a:off x="2353734" y="3697061"/>
-            <a:ext cx="0" cy="301859"/>
+            <a:off x="2742033" y="3594223"/>
+            <a:ext cx="0" cy="391442"/>
           </a:xfrm>
           <a:prstGeom prst="straightConnector1">
             <a:avLst/>
           </a:prstGeom>
           <a:ln w="28575">
             <a:solidFill>
-              <a:srgbClr val="C00000"/>
+              <a:schemeClr val="bg2">
+                <a:lumMod val="25000"/>
+              </a:schemeClr>
             </a:solidFill>
             <a:prstDash val="solid"/>
             <a:tailEnd type="arrow"/>
@@ -4566,8 +4489,8 @@
         </p:nvSpPr>
         <p:spPr>
           <a:xfrm>
-            <a:off x="4936069" y="2909316"/>
-            <a:ext cx="1219201" cy="533400"/>
+            <a:off x="5335691" y="2909316"/>
+            <a:ext cx="1316991" cy="533400"/>
           </a:xfrm>
           <a:prstGeom prst="ellipse">
             <a:avLst/>
@@ -4624,8 +4547,8 @@
         </p:nvSpPr>
         <p:spPr>
           <a:xfrm>
-            <a:off x="5888569" y="3515641"/>
-            <a:ext cx="1219201" cy="533400"/>
+            <a:off x="6288191" y="3515641"/>
+            <a:ext cx="1316991" cy="533400"/>
           </a:xfrm>
           <a:prstGeom prst="ellipse">
             <a:avLst/>
@@ -4664,7 +4587,7 @@
           <a:p>
             <a:pPr algn="ctr"/>
             <a:r>
-              <a:rPr lang="en-US" sz="1600" dirty="0" smtClean="0">
+              <a:rPr lang="en-US" sz="1600" dirty="0">
                 <a:solidFill>
                   <a:schemeClr val="bg1"/>
                 </a:solidFill>
@@ -4672,25 +4595,20 @@
               <a:t>Logs</a:t>
             </a:r>
             <a:br>
-              <a:rPr lang="en-US" sz="1600" dirty="0" smtClean="0">
+              <a:rPr lang="en-US" sz="1600" dirty="0">
                 <a:solidFill>
                   <a:schemeClr val="bg1"/>
                 </a:solidFill>
               </a:rPr>
             </a:br>
             <a:r>
-              <a:rPr lang="en-US" sz="1600" dirty="0" smtClean="0">
+              <a:rPr lang="en-US" sz="1600" dirty="0">
                 <a:solidFill>
                   <a:schemeClr val="bg1"/>
                 </a:solidFill>
               </a:rPr>
               <a:t>Center</a:t>
             </a:r>
-            <a:endParaRPr lang="en-US" sz="1600" dirty="0">
-              <a:solidFill>
-                <a:schemeClr val="bg1"/>
-              </a:solidFill>
-            </a:endParaRPr>
           </a:p>
         </p:txBody>
       </p:sp>
@@ -4705,8 +4623,8 @@
         </p:nvCxnSpPr>
         <p:spPr>
           <a:xfrm rot="5400000">
-            <a:off x="6034638" y="3890781"/>
-            <a:ext cx="305273" cy="621793"/>
+            <a:off x="6507603" y="3915229"/>
+            <a:ext cx="305273" cy="572897"/>
           </a:xfrm>
           <a:prstGeom prst="bentConnector2">
             <a:avLst/>
@@ -4743,9 +4661,9 @@
           <p:nvPr/>
         </p:nvCxnSpPr>
         <p:spPr>
-          <a:xfrm rot="5400000">
-            <a:off x="5195574" y="3792812"/>
-            <a:ext cx="700192" cy="1"/>
+          <a:xfrm rot="16200000" flipH="1">
+            <a:off x="5668538" y="3768364"/>
+            <a:ext cx="700193" cy="48895"/>
           </a:xfrm>
           <a:prstGeom prst="bentConnector3">
             <a:avLst/>
@@ -4756,6 +4674,120 @@
                 <a:lumMod val="75000"/>
               </a:schemeClr>
             </a:solidFill>
+          </a:ln>
+        </p:spPr>
+        <p:style>
+          <a:lnRef idx="1">
+            <a:schemeClr val="accent1"/>
+          </a:lnRef>
+          <a:fillRef idx="0">
+            <a:schemeClr val="accent1"/>
+          </a:fillRef>
+          <a:effectRef idx="0">
+            <a:schemeClr val="accent1"/>
+          </a:effectRef>
+          <a:fontRef idx="minor">
+            <a:schemeClr val="tx1"/>
+          </a:fontRef>
+        </p:style>
+      </p:cxnSp>
+      <p:sp>
+        <p:nvSpPr>
+          <p:cNvPr id="41" name="Rectangle 62">
+            <a:extLst>
+              <a:ext uri="{FF2B5EF4-FFF2-40B4-BE49-F238E27FC236}">
+                <a16:creationId xmlns:a16="http://schemas.microsoft.com/office/drawing/2014/main" id="{37914919-A437-49B3-B8F9-F55A438CA60A}"/>
+              </a:ext>
+            </a:extLst>
+          </p:cNvPr>
+          <p:cNvSpPr/>
+          <p:nvPr/>
+        </p:nvSpPr>
+        <p:spPr>
+          <a:xfrm flipH="1">
+            <a:off x="2372924" y="4049041"/>
+            <a:ext cx="841407" cy="570908"/>
+          </a:xfrm>
+          <a:prstGeom prst="roundRect">
+            <a:avLst/>
+          </a:prstGeom>
+          <a:solidFill>
+            <a:schemeClr val="bg2">
+              <a:lumMod val="25000"/>
+            </a:schemeClr>
+          </a:solidFill>
+          <a:ln w="19050">
+            <a:solidFill>
+              <a:schemeClr val="bg2">
+                <a:lumMod val="25000"/>
+              </a:schemeClr>
+            </a:solidFill>
+          </a:ln>
+          <a:effectLst/>
+        </p:spPr>
+        <p:style>
+          <a:lnRef idx="1">
+            <a:schemeClr val="accent2"/>
+          </a:lnRef>
+          <a:fillRef idx="2">
+            <a:schemeClr val="accent2"/>
+          </a:fillRef>
+          <a:effectRef idx="1">
+            <a:schemeClr val="accent2"/>
+          </a:effectRef>
+          <a:fontRef idx="minor">
+            <a:schemeClr val="dk1"/>
+          </a:fontRef>
+        </p:style>
+        <p:txBody>
+          <a:bodyPr rtlCol="0" anchor="ctr"/>
+          <a:lstStyle/>
+          <a:p>
+            <a:pPr algn="ctr"/>
+            <a:r>
+              <a:rPr lang="en-US" sz="1600" dirty="0">
+                <a:solidFill>
+                  <a:schemeClr val="bg1"/>
+                </a:solidFill>
+              </a:rPr>
+              <a:t>Login</a:t>
+            </a:r>
+            <a:endParaRPr lang="en-SG" sz="1600" dirty="0">
+              <a:solidFill>
+                <a:schemeClr val="bg1"/>
+              </a:solidFill>
+            </a:endParaRPr>
+          </a:p>
+        </p:txBody>
+      </p:sp>
+      <p:cxnSp>
+        <p:nvCxnSpPr>
+          <p:cNvPr id="42" name="Straight Arrow Connector 41">
+            <a:extLst>
+              <a:ext uri="{FF2B5EF4-FFF2-40B4-BE49-F238E27FC236}">
+                <a16:creationId xmlns:a16="http://schemas.microsoft.com/office/drawing/2014/main" id="{10E50C03-D66D-4439-9FE8-AF6E26889916}"/>
+              </a:ext>
+            </a:extLst>
+          </p:cNvPr>
+          <p:cNvCxnSpPr>
+            <a:cxnSpLocks/>
+          </p:cNvCxnSpPr>
+          <p:nvPr/>
+        </p:nvCxnSpPr>
+        <p:spPr>
+          <a:xfrm>
+            <a:off x="2057400" y="4334495"/>
+            <a:ext cx="249771" cy="0"/>
+          </a:xfrm>
+          <a:prstGeom prst="straightConnector1">
+            <a:avLst/>
+          </a:prstGeom>
+          <a:ln w="28575">
+            <a:solidFill>
+              <a:srgbClr val="C00000"/>
+            </a:solidFill>
+            <a:prstDash val="solid"/>
+            <a:tailEnd type="arrow"/>
           </a:ln>
         </p:spPr>
         <p:style>

</xml_diff>

<commit_message>
Refactor network component (#113)
* Refactor network component
* Instead of using request and result events, network API methods now return CompletableFuture
</commit_message>
<xml_diff>
--- a/docs/diagrams/ArchitectureDiagram.pptx
+++ b/docs/diagrams/ArchitectureDiagram.pptx
@@ -208,7 +208,7 @@
           <a:p>
             <a:fld id="{F5CC4B3F-88C1-4FFA-B1B6-F41C21DC6924}" type="datetimeFigureOut">
               <a:rPr lang="en-US" smtClean="0"/>
-              <a:t>3/22/2018</a:t>
+              <a:t>3/29/2018</a:t>
             </a:fld>
             <a:endParaRPr lang="en-US"/>
           </a:p>
@@ -657,7 +657,7 @@
           <a:p>
             <a:fld id="{78C97017-6FC3-485B-9764-EAC9E56C1D49}" type="datetimeFigureOut">
               <a:rPr lang="en-US" smtClean="0"/>
-              <a:t>3/22/2018</a:t>
+              <a:t>3/29/2018</a:t>
             </a:fld>
             <a:endParaRPr lang="en-US"/>
           </a:p>
@@ -827,7 +827,7 @@
           <a:p>
             <a:fld id="{78C97017-6FC3-485B-9764-EAC9E56C1D49}" type="datetimeFigureOut">
               <a:rPr lang="en-US" smtClean="0"/>
-              <a:t>3/22/2018</a:t>
+              <a:t>3/29/2018</a:t>
             </a:fld>
             <a:endParaRPr lang="en-US"/>
           </a:p>
@@ -1007,7 +1007,7 @@
           <a:p>
             <a:fld id="{78C97017-6FC3-485B-9764-EAC9E56C1D49}" type="datetimeFigureOut">
               <a:rPr lang="en-US" smtClean="0"/>
-              <a:t>3/22/2018</a:t>
+              <a:t>3/29/2018</a:t>
             </a:fld>
             <a:endParaRPr lang="en-US"/>
           </a:p>
@@ -1177,7 +1177,7 @@
           <a:p>
             <a:fld id="{78C97017-6FC3-485B-9764-EAC9E56C1D49}" type="datetimeFigureOut">
               <a:rPr lang="en-US" smtClean="0"/>
-              <a:t>3/22/2018</a:t>
+              <a:t>3/29/2018</a:t>
             </a:fld>
             <a:endParaRPr lang="en-US"/>
           </a:p>
@@ -1423,7 +1423,7 @@
           <a:p>
             <a:fld id="{78C97017-6FC3-485B-9764-EAC9E56C1D49}" type="datetimeFigureOut">
               <a:rPr lang="en-US" smtClean="0"/>
-              <a:t>3/22/2018</a:t>
+              <a:t>3/29/2018</a:t>
             </a:fld>
             <a:endParaRPr lang="en-US"/>
           </a:p>
@@ -1711,7 +1711,7 @@
           <a:p>
             <a:fld id="{78C97017-6FC3-485B-9764-EAC9E56C1D49}" type="datetimeFigureOut">
               <a:rPr lang="en-US" smtClean="0"/>
-              <a:t>3/22/2018</a:t>
+              <a:t>3/29/2018</a:t>
             </a:fld>
             <a:endParaRPr lang="en-US"/>
           </a:p>
@@ -2133,7 +2133,7 @@
           <a:p>
             <a:fld id="{78C97017-6FC3-485B-9764-EAC9E56C1D49}" type="datetimeFigureOut">
               <a:rPr lang="en-US" smtClean="0"/>
-              <a:t>3/22/2018</a:t>
+              <a:t>3/29/2018</a:t>
             </a:fld>
             <a:endParaRPr lang="en-US"/>
           </a:p>
@@ -2251,7 +2251,7 @@
           <a:p>
             <a:fld id="{78C97017-6FC3-485B-9764-EAC9E56C1D49}" type="datetimeFigureOut">
               <a:rPr lang="en-US" smtClean="0"/>
-              <a:t>3/22/2018</a:t>
+              <a:t>3/29/2018</a:t>
             </a:fld>
             <a:endParaRPr lang="en-US"/>
           </a:p>
@@ -2346,7 +2346,7 @@
           <a:p>
             <a:fld id="{78C97017-6FC3-485B-9764-EAC9E56C1D49}" type="datetimeFigureOut">
               <a:rPr lang="en-US" smtClean="0"/>
-              <a:t>3/22/2018</a:t>
+              <a:t>3/29/2018</a:t>
             </a:fld>
             <a:endParaRPr lang="en-US"/>
           </a:p>
@@ -2623,7 +2623,7 @@
           <a:p>
             <a:fld id="{78C97017-6FC3-485B-9764-EAC9E56C1D49}" type="datetimeFigureOut">
               <a:rPr lang="en-US" smtClean="0"/>
-              <a:t>3/22/2018</a:t>
+              <a:t>3/29/2018</a:t>
             </a:fld>
             <a:endParaRPr lang="en-US"/>
           </a:p>
@@ -2876,7 +2876,7 @@
           <a:p>
             <a:fld id="{78C97017-6FC3-485B-9764-EAC9E56C1D49}" type="datetimeFigureOut">
               <a:rPr lang="en-US" smtClean="0"/>
-              <a:t>3/22/2018</a:t>
+              <a:t>3/29/2018</a:t>
             </a:fld>
             <a:endParaRPr lang="en-US"/>
           </a:p>
@@ -3089,7 +3089,7 @@
           <a:p>
             <a:fld id="{78C97017-6FC3-485B-9764-EAC9E56C1D49}" type="datetimeFigureOut">
               <a:rPr lang="en-US" smtClean="0"/>
-              <a:t>3/22/2018</a:t>
+              <a:t>3/29/2018</a:t>
             </a:fld>
             <a:endParaRPr lang="en-US"/>
           </a:p>
@@ -4843,6 +4843,42 @@
               <a:schemeClr val="accent2"/>
             </a:solidFill>
             <a:prstDash val="sysDot"/>
+            <a:tailEnd type="arrow"/>
+          </a:ln>
+        </p:spPr>
+        <p:style>
+          <a:lnRef idx="1">
+            <a:schemeClr val="accent1"/>
+          </a:lnRef>
+          <a:fillRef idx="0">
+            <a:schemeClr val="accent1"/>
+          </a:fillRef>
+          <a:effectRef idx="0">
+            <a:schemeClr val="accent1"/>
+          </a:effectRef>
+          <a:fontRef idx="minor">
+            <a:schemeClr val="tx1"/>
+          </a:fontRef>
+        </p:style>
+      </p:cxnSp>
+      <p:cxnSp>
+        <p:nvCxnSpPr>
+          <p:cNvPr id="43" name="Straight Arrow Connector 42"/>
+          <p:cNvCxnSpPr/>
+          <p:nvPr/>
+        </p:nvCxnSpPr>
+        <p:spPr>
+          <a:xfrm>
+            <a:off x="4354781" y="2722170"/>
+            <a:ext cx="445818" cy="364393"/>
+          </a:xfrm>
+          <a:prstGeom prst="straightConnector1">
+            <a:avLst/>
+          </a:prstGeom>
+          <a:ln w="28575">
+            <a:solidFill>
+              <a:srgbClr val="0070C0"/>
+            </a:solidFill>
             <a:tailEnd type="arrow"/>
           </a:ln>
         </p:spPr>

</xml_diff>

<commit_message>
Minor tweaks to DG
</commit_message>
<xml_diff>
--- a/docs/diagrams/ArchitectureDiagram.pptx
+++ b/docs/diagrams/ArchitectureDiagram.pptx
@@ -107,6 +107,22 @@
       </a:defRPr>
     </a:lvl9pPr>
   </p:defaultTextStyle>
+  <p:extLst>
+    <p:ext uri="{EFAFB233-063F-42B5-8137-9DF3F51BA10A}">
+      <p15:sldGuideLst xmlns:p15="http://schemas.microsoft.com/office/powerpoint/2012/main">
+        <p15:guide id="1" orient="horz" pos="1488">
+          <p15:clr>
+            <a:srgbClr val="A4A3A4"/>
+          </p15:clr>
+        </p15:guide>
+        <p15:guide id="2" pos="2880">
+          <p15:clr>
+            <a:srgbClr val="A4A3A4"/>
+          </p15:clr>
+        </p15:guide>
+      </p15:sldGuideLst>
+    </p:ext>
+  </p:extLst>
 </p:presentation>
 </file>
 
@@ -192,7 +208,7 @@
           <a:p>
             <a:fld id="{F5CC4B3F-88C1-4FFA-B1B6-F41C21DC6924}" type="datetimeFigureOut">
               <a:rPr lang="en-US" smtClean="0"/>
-              <a:t>10/16/2016</a:t>
+              <a:t>4/15/2018</a:t>
             </a:fld>
             <a:endParaRPr lang="en-US"/>
           </a:p>
@@ -256,38 +272,37 @@
           <a:p>
             <a:pPr lvl="0"/>
             <a:r>
-              <a:rPr lang="en-US" smtClean="0"/>
+              <a:rPr lang="en-US"/>
               <a:t>Click to edit Master text styles</a:t>
             </a:r>
           </a:p>
           <a:p>
             <a:pPr lvl="1"/>
             <a:r>
-              <a:rPr lang="en-US" smtClean="0"/>
+              <a:rPr lang="en-US"/>
               <a:t>Second level</a:t>
             </a:r>
           </a:p>
           <a:p>
             <a:pPr lvl="2"/>
             <a:r>
-              <a:rPr lang="en-US" smtClean="0"/>
+              <a:rPr lang="en-US"/>
               <a:t>Third level</a:t>
             </a:r>
           </a:p>
           <a:p>
             <a:pPr lvl="3"/>
             <a:r>
-              <a:rPr lang="en-US" smtClean="0"/>
+              <a:rPr lang="en-US"/>
               <a:t>Fourth level</a:t>
             </a:r>
           </a:p>
           <a:p>
             <a:pPr lvl="4"/>
             <a:r>
-              <a:rPr lang="en-US" smtClean="0"/>
+              <a:rPr lang="en-US"/>
               <a:t>Fifth level</a:t>
             </a:r>
-            <a:endParaRPr lang="en-US"/>
           </a:p>
         </p:txBody>
       </p:sp>
@@ -498,10 +513,9 @@
           <a:lstStyle/>
           <a:p>
             <a:r>
-              <a:rPr lang="en-US" smtClean="0"/>
+              <a:rPr lang="en-US"/>
               <a:t>Click to edit Master title style</a:t>
             </a:r>
-            <a:endParaRPr lang="en-US"/>
           </a:p>
         </p:txBody>
       </p:sp>
@@ -617,10 +631,9 @@
           </a:lstStyle>
           <a:p>
             <a:r>
-              <a:rPr lang="en-US" smtClean="0"/>
+              <a:rPr lang="en-US"/>
               <a:t>Click to edit Master subtitle style</a:t>
             </a:r>
-            <a:endParaRPr lang="en-US"/>
           </a:p>
         </p:txBody>
       </p:sp>
@@ -641,7 +654,7 @@
           <a:p>
             <a:fld id="{78C97017-6FC3-485B-9764-EAC9E56C1D49}" type="datetimeFigureOut">
               <a:rPr lang="en-US" smtClean="0"/>
-              <a:t>10/16/2016</a:t>
+              <a:t>4/15/2018</a:t>
             </a:fld>
             <a:endParaRPr lang="en-US"/>
           </a:p>
@@ -735,10 +748,9 @@
           <a:lstStyle/>
           <a:p>
             <a:r>
-              <a:rPr lang="en-US" smtClean="0"/>
+              <a:rPr lang="en-US"/>
               <a:t>Click to edit Master title style</a:t>
             </a:r>
-            <a:endParaRPr lang="en-US"/>
           </a:p>
         </p:txBody>
       </p:sp>
@@ -759,38 +771,37 @@
           <a:p>
             <a:pPr lvl="0"/>
             <a:r>
-              <a:rPr lang="en-US" smtClean="0"/>
+              <a:rPr lang="en-US"/>
               <a:t>Click to edit Master text styles</a:t>
             </a:r>
           </a:p>
           <a:p>
             <a:pPr lvl="1"/>
             <a:r>
-              <a:rPr lang="en-US" smtClean="0"/>
+              <a:rPr lang="en-US"/>
               <a:t>Second level</a:t>
             </a:r>
           </a:p>
           <a:p>
             <a:pPr lvl="2"/>
             <a:r>
-              <a:rPr lang="en-US" smtClean="0"/>
+              <a:rPr lang="en-US"/>
               <a:t>Third level</a:t>
             </a:r>
           </a:p>
           <a:p>
             <a:pPr lvl="3"/>
             <a:r>
-              <a:rPr lang="en-US" smtClean="0"/>
+              <a:rPr lang="en-US"/>
               <a:t>Fourth level</a:t>
             </a:r>
           </a:p>
           <a:p>
             <a:pPr lvl="4"/>
             <a:r>
-              <a:rPr lang="en-US" smtClean="0"/>
+              <a:rPr lang="en-US"/>
               <a:t>Fifth level</a:t>
             </a:r>
-            <a:endParaRPr lang="en-US"/>
           </a:p>
         </p:txBody>
       </p:sp>
@@ -811,7 +822,7 @@
           <a:p>
             <a:fld id="{78C97017-6FC3-485B-9764-EAC9E56C1D49}" type="datetimeFigureOut">
               <a:rPr lang="en-US" smtClean="0"/>
-              <a:t>10/16/2016</a:t>
+              <a:t>4/15/2018</a:t>
             </a:fld>
             <a:endParaRPr lang="en-US"/>
           </a:p>
@@ -910,10 +921,9 @@
           <a:lstStyle/>
           <a:p>
             <a:r>
-              <a:rPr lang="en-US" smtClean="0"/>
+              <a:rPr lang="en-US"/>
               <a:t>Click to edit Master title style</a:t>
             </a:r>
-            <a:endParaRPr lang="en-US"/>
           </a:p>
         </p:txBody>
       </p:sp>
@@ -939,38 +949,37 @@
           <a:p>
             <a:pPr lvl="0"/>
             <a:r>
-              <a:rPr lang="en-US" smtClean="0"/>
+              <a:rPr lang="en-US"/>
               <a:t>Click to edit Master text styles</a:t>
             </a:r>
           </a:p>
           <a:p>
             <a:pPr lvl="1"/>
             <a:r>
-              <a:rPr lang="en-US" smtClean="0"/>
+              <a:rPr lang="en-US"/>
               <a:t>Second level</a:t>
             </a:r>
           </a:p>
           <a:p>
             <a:pPr lvl="2"/>
             <a:r>
-              <a:rPr lang="en-US" smtClean="0"/>
+              <a:rPr lang="en-US"/>
               <a:t>Third level</a:t>
             </a:r>
           </a:p>
           <a:p>
             <a:pPr lvl="3"/>
             <a:r>
-              <a:rPr lang="en-US" smtClean="0"/>
+              <a:rPr lang="en-US"/>
               <a:t>Fourth level</a:t>
             </a:r>
           </a:p>
           <a:p>
             <a:pPr lvl="4"/>
             <a:r>
-              <a:rPr lang="en-US" smtClean="0"/>
+              <a:rPr lang="en-US"/>
               <a:t>Fifth level</a:t>
             </a:r>
-            <a:endParaRPr lang="en-US"/>
           </a:p>
         </p:txBody>
       </p:sp>
@@ -991,7 +1000,7 @@
           <a:p>
             <a:fld id="{78C97017-6FC3-485B-9764-EAC9E56C1D49}" type="datetimeFigureOut">
               <a:rPr lang="en-US" smtClean="0"/>
-              <a:t>10/16/2016</a:t>
+              <a:t>4/15/2018</a:t>
             </a:fld>
             <a:endParaRPr lang="en-US"/>
           </a:p>
@@ -1085,10 +1094,9 @@
           <a:lstStyle/>
           <a:p>
             <a:r>
-              <a:rPr lang="en-US" smtClean="0"/>
+              <a:rPr lang="en-US"/>
               <a:t>Click to edit Master title style</a:t>
             </a:r>
-            <a:endParaRPr lang="en-US"/>
           </a:p>
         </p:txBody>
       </p:sp>
@@ -1109,38 +1117,37 @@
           <a:p>
             <a:pPr lvl="0"/>
             <a:r>
-              <a:rPr lang="en-US" smtClean="0"/>
+              <a:rPr lang="en-US"/>
               <a:t>Click to edit Master text styles</a:t>
             </a:r>
           </a:p>
           <a:p>
             <a:pPr lvl="1"/>
             <a:r>
-              <a:rPr lang="en-US" smtClean="0"/>
+              <a:rPr lang="en-US"/>
               <a:t>Second level</a:t>
             </a:r>
           </a:p>
           <a:p>
             <a:pPr lvl="2"/>
             <a:r>
-              <a:rPr lang="en-US" smtClean="0"/>
+              <a:rPr lang="en-US"/>
               <a:t>Third level</a:t>
             </a:r>
           </a:p>
           <a:p>
             <a:pPr lvl="3"/>
             <a:r>
-              <a:rPr lang="en-US" smtClean="0"/>
+              <a:rPr lang="en-US"/>
               <a:t>Fourth level</a:t>
             </a:r>
           </a:p>
           <a:p>
             <a:pPr lvl="4"/>
             <a:r>
-              <a:rPr lang="en-US" smtClean="0"/>
+              <a:rPr lang="en-US"/>
               <a:t>Fifth level</a:t>
             </a:r>
-            <a:endParaRPr lang="en-US"/>
           </a:p>
         </p:txBody>
       </p:sp>
@@ -1161,7 +1168,7 @@
           <a:p>
             <a:fld id="{78C97017-6FC3-485B-9764-EAC9E56C1D49}" type="datetimeFigureOut">
               <a:rPr lang="en-US" smtClean="0"/>
-              <a:t>10/16/2016</a:t>
+              <a:t>4/15/2018</a:t>
             </a:fld>
             <a:endParaRPr lang="en-US"/>
           </a:p>
@@ -1264,10 +1271,9 @@
           </a:lstStyle>
           <a:p>
             <a:r>
-              <a:rPr lang="en-US" smtClean="0"/>
+              <a:rPr lang="en-US"/>
               <a:t>Click to edit Master title style</a:t>
             </a:r>
-            <a:endParaRPr lang="en-US"/>
           </a:p>
         </p:txBody>
       </p:sp>
@@ -1384,7 +1390,7 @@
           <a:p>
             <a:pPr lvl="0"/>
             <a:r>
-              <a:rPr lang="en-US" smtClean="0"/>
+              <a:rPr lang="en-US"/>
               <a:t>Click to edit Master text styles</a:t>
             </a:r>
           </a:p>
@@ -1407,7 +1413,7 @@
           <a:p>
             <a:fld id="{78C97017-6FC3-485B-9764-EAC9E56C1D49}" type="datetimeFigureOut">
               <a:rPr lang="en-US" smtClean="0"/>
-              <a:t>10/16/2016</a:t>
+              <a:t>4/15/2018</a:t>
             </a:fld>
             <a:endParaRPr lang="en-US"/>
           </a:p>
@@ -1501,10 +1507,9 @@
           <a:lstStyle/>
           <a:p>
             <a:r>
-              <a:rPr lang="en-US" smtClean="0"/>
+              <a:rPr lang="en-US"/>
               <a:t>Click to edit Master title style</a:t>
             </a:r>
-            <a:endParaRPr lang="en-US"/>
           </a:p>
         </p:txBody>
       </p:sp>
@@ -1558,38 +1563,37 @@
           <a:p>
             <a:pPr lvl="0"/>
             <a:r>
-              <a:rPr lang="en-US" smtClean="0"/>
+              <a:rPr lang="en-US"/>
               <a:t>Click to edit Master text styles</a:t>
             </a:r>
           </a:p>
           <a:p>
             <a:pPr lvl="1"/>
             <a:r>
-              <a:rPr lang="en-US" smtClean="0"/>
+              <a:rPr lang="en-US"/>
               <a:t>Second level</a:t>
             </a:r>
           </a:p>
           <a:p>
             <a:pPr lvl="2"/>
             <a:r>
-              <a:rPr lang="en-US" smtClean="0"/>
+              <a:rPr lang="en-US"/>
               <a:t>Third level</a:t>
             </a:r>
           </a:p>
           <a:p>
             <a:pPr lvl="3"/>
             <a:r>
-              <a:rPr lang="en-US" smtClean="0"/>
+              <a:rPr lang="en-US"/>
               <a:t>Fourth level</a:t>
             </a:r>
           </a:p>
           <a:p>
             <a:pPr lvl="4"/>
             <a:r>
-              <a:rPr lang="en-US" smtClean="0"/>
+              <a:rPr lang="en-US"/>
               <a:t>Fifth level</a:t>
             </a:r>
-            <a:endParaRPr lang="en-US"/>
           </a:p>
         </p:txBody>
       </p:sp>
@@ -1643,38 +1647,37 @@
           <a:p>
             <a:pPr lvl="0"/>
             <a:r>
-              <a:rPr lang="en-US" smtClean="0"/>
+              <a:rPr lang="en-US"/>
               <a:t>Click to edit Master text styles</a:t>
             </a:r>
           </a:p>
           <a:p>
             <a:pPr lvl="1"/>
             <a:r>
-              <a:rPr lang="en-US" smtClean="0"/>
+              <a:rPr lang="en-US"/>
               <a:t>Second level</a:t>
             </a:r>
           </a:p>
           <a:p>
             <a:pPr lvl="2"/>
             <a:r>
-              <a:rPr lang="en-US" smtClean="0"/>
+              <a:rPr lang="en-US"/>
               <a:t>Third level</a:t>
             </a:r>
           </a:p>
           <a:p>
             <a:pPr lvl="3"/>
             <a:r>
-              <a:rPr lang="en-US" smtClean="0"/>
+              <a:rPr lang="en-US"/>
               <a:t>Fourth level</a:t>
             </a:r>
           </a:p>
           <a:p>
             <a:pPr lvl="4"/>
             <a:r>
-              <a:rPr lang="en-US" smtClean="0"/>
+              <a:rPr lang="en-US"/>
               <a:t>Fifth level</a:t>
             </a:r>
-            <a:endParaRPr lang="en-US"/>
           </a:p>
         </p:txBody>
       </p:sp>
@@ -1695,7 +1698,7 @@
           <a:p>
             <a:fld id="{78C97017-6FC3-485B-9764-EAC9E56C1D49}" type="datetimeFigureOut">
               <a:rPr lang="en-US" smtClean="0"/>
-              <a:t>10/16/2016</a:t>
+              <a:t>4/15/2018</a:t>
             </a:fld>
             <a:endParaRPr lang="en-US"/>
           </a:p>
@@ -1793,10 +1796,9 @@
           </a:lstStyle>
           <a:p>
             <a:r>
-              <a:rPr lang="en-US" smtClean="0"/>
+              <a:rPr lang="en-US"/>
               <a:t>Click to edit Master title style</a:t>
             </a:r>
-            <a:endParaRPr lang="en-US"/>
           </a:p>
         </p:txBody>
       </p:sp>
@@ -1859,7 +1861,7 @@
           <a:p>
             <a:pPr lvl="0"/>
             <a:r>
-              <a:rPr lang="en-US" smtClean="0"/>
+              <a:rPr lang="en-US"/>
               <a:t>Click to edit Master text styles</a:t>
             </a:r>
           </a:p>
@@ -1915,38 +1917,37 @@
           <a:p>
             <a:pPr lvl="0"/>
             <a:r>
-              <a:rPr lang="en-US" smtClean="0"/>
+              <a:rPr lang="en-US"/>
               <a:t>Click to edit Master text styles</a:t>
             </a:r>
           </a:p>
           <a:p>
             <a:pPr lvl="1"/>
             <a:r>
-              <a:rPr lang="en-US" smtClean="0"/>
+              <a:rPr lang="en-US"/>
               <a:t>Second level</a:t>
             </a:r>
           </a:p>
           <a:p>
             <a:pPr lvl="2"/>
             <a:r>
-              <a:rPr lang="en-US" smtClean="0"/>
+              <a:rPr lang="en-US"/>
               <a:t>Third level</a:t>
             </a:r>
           </a:p>
           <a:p>
             <a:pPr lvl="3"/>
             <a:r>
-              <a:rPr lang="en-US" smtClean="0"/>
+              <a:rPr lang="en-US"/>
               <a:t>Fourth level</a:t>
             </a:r>
           </a:p>
           <a:p>
             <a:pPr lvl="4"/>
             <a:r>
-              <a:rPr lang="en-US" smtClean="0"/>
+              <a:rPr lang="en-US"/>
               <a:t>Fifth level</a:t>
             </a:r>
-            <a:endParaRPr lang="en-US"/>
           </a:p>
         </p:txBody>
       </p:sp>
@@ -2009,7 +2010,7 @@
           <a:p>
             <a:pPr lvl="0"/>
             <a:r>
-              <a:rPr lang="en-US" smtClean="0"/>
+              <a:rPr lang="en-US"/>
               <a:t>Click to edit Master text styles</a:t>
             </a:r>
           </a:p>
@@ -2065,38 +2066,37 @@
           <a:p>
             <a:pPr lvl="0"/>
             <a:r>
-              <a:rPr lang="en-US" smtClean="0"/>
+              <a:rPr lang="en-US"/>
               <a:t>Click to edit Master text styles</a:t>
             </a:r>
           </a:p>
           <a:p>
             <a:pPr lvl="1"/>
             <a:r>
-              <a:rPr lang="en-US" smtClean="0"/>
+              <a:rPr lang="en-US"/>
               <a:t>Second level</a:t>
             </a:r>
           </a:p>
           <a:p>
             <a:pPr lvl="2"/>
             <a:r>
-              <a:rPr lang="en-US" smtClean="0"/>
+              <a:rPr lang="en-US"/>
               <a:t>Third level</a:t>
             </a:r>
           </a:p>
           <a:p>
             <a:pPr lvl="3"/>
             <a:r>
-              <a:rPr lang="en-US" smtClean="0"/>
+              <a:rPr lang="en-US"/>
               <a:t>Fourth level</a:t>
             </a:r>
           </a:p>
           <a:p>
             <a:pPr lvl="4"/>
             <a:r>
-              <a:rPr lang="en-US" smtClean="0"/>
+              <a:rPr lang="en-US"/>
               <a:t>Fifth level</a:t>
             </a:r>
-            <a:endParaRPr lang="en-US"/>
           </a:p>
         </p:txBody>
       </p:sp>
@@ -2117,7 +2117,7 @@
           <a:p>
             <a:fld id="{78C97017-6FC3-485B-9764-EAC9E56C1D49}" type="datetimeFigureOut">
               <a:rPr lang="en-US" smtClean="0"/>
-              <a:t>10/16/2016</a:t>
+              <a:t>4/15/2018</a:t>
             </a:fld>
             <a:endParaRPr lang="en-US"/>
           </a:p>
@@ -2211,10 +2211,9 @@
           <a:lstStyle/>
           <a:p>
             <a:r>
-              <a:rPr lang="en-US" smtClean="0"/>
+              <a:rPr lang="en-US"/>
               <a:t>Click to edit Master title style</a:t>
             </a:r>
-            <a:endParaRPr lang="en-US"/>
           </a:p>
         </p:txBody>
       </p:sp>
@@ -2235,7 +2234,7 @@
           <a:p>
             <a:fld id="{78C97017-6FC3-485B-9764-EAC9E56C1D49}" type="datetimeFigureOut">
               <a:rPr lang="en-US" smtClean="0"/>
-              <a:t>10/16/2016</a:t>
+              <a:t>4/15/2018</a:t>
             </a:fld>
             <a:endParaRPr lang="en-US"/>
           </a:p>
@@ -2330,7 +2329,7 @@
           <a:p>
             <a:fld id="{78C97017-6FC3-485B-9764-EAC9E56C1D49}" type="datetimeFigureOut">
               <a:rPr lang="en-US" smtClean="0"/>
-              <a:t>10/16/2016</a:t>
+              <a:t>4/15/2018</a:t>
             </a:fld>
             <a:endParaRPr lang="en-US"/>
           </a:p>
@@ -2433,10 +2432,9 @@
           </a:lstStyle>
           <a:p>
             <a:r>
-              <a:rPr lang="en-US" smtClean="0"/>
+              <a:rPr lang="en-US"/>
               <a:t>Click to edit Master title style</a:t>
             </a:r>
-            <a:endParaRPr lang="en-US"/>
           </a:p>
         </p:txBody>
       </p:sp>
@@ -2490,38 +2488,37 @@
           <a:p>
             <a:pPr lvl="0"/>
             <a:r>
-              <a:rPr lang="en-US" smtClean="0"/>
+              <a:rPr lang="en-US"/>
               <a:t>Click to edit Master text styles</a:t>
             </a:r>
           </a:p>
           <a:p>
             <a:pPr lvl="1"/>
             <a:r>
-              <a:rPr lang="en-US" smtClean="0"/>
+              <a:rPr lang="en-US"/>
               <a:t>Second level</a:t>
             </a:r>
           </a:p>
           <a:p>
             <a:pPr lvl="2"/>
             <a:r>
-              <a:rPr lang="en-US" smtClean="0"/>
+              <a:rPr lang="en-US"/>
               <a:t>Third level</a:t>
             </a:r>
           </a:p>
           <a:p>
             <a:pPr lvl="3"/>
             <a:r>
-              <a:rPr lang="en-US" smtClean="0"/>
+              <a:rPr lang="en-US"/>
               <a:t>Fourth level</a:t>
             </a:r>
           </a:p>
           <a:p>
             <a:pPr lvl="4"/>
             <a:r>
-              <a:rPr lang="en-US" smtClean="0"/>
+              <a:rPr lang="en-US"/>
               <a:t>Fifth level</a:t>
             </a:r>
-            <a:endParaRPr lang="en-US"/>
           </a:p>
         </p:txBody>
       </p:sp>
@@ -2584,7 +2581,7 @@
           <a:p>
             <a:pPr lvl="0"/>
             <a:r>
-              <a:rPr lang="en-US" smtClean="0"/>
+              <a:rPr lang="en-US"/>
               <a:t>Click to edit Master text styles</a:t>
             </a:r>
           </a:p>
@@ -2607,7 +2604,7 @@
           <a:p>
             <a:fld id="{78C97017-6FC3-485B-9764-EAC9E56C1D49}" type="datetimeFigureOut">
               <a:rPr lang="en-US" smtClean="0"/>
-              <a:t>10/16/2016</a:t>
+              <a:t>4/15/2018</a:t>
             </a:fld>
             <a:endParaRPr lang="en-US"/>
           </a:p>
@@ -2710,10 +2707,9 @@
           </a:lstStyle>
           <a:p>
             <a:r>
-              <a:rPr lang="en-US" smtClean="0"/>
+              <a:rPr lang="en-US"/>
               <a:t>Click to edit Master title style</a:t>
             </a:r>
-            <a:endParaRPr lang="en-US"/>
           </a:p>
         </p:txBody>
       </p:sp>
@@ -2837,7 +2833,7 @@
           <a:p>
             <a:pPr lvl="0"/>
             <a:r>
-              <a:rPr lang="en-US" smtClean="0"/>
+              <a:rPr lang="en-US"/>
               <a:t>Click to edit Master text styles</a:t>
             </a:r>
           </a:p>
@@ -2860,7 +2856,7 @@
           <a:p>
             <a:fld id="{78C97017-6FC3-485B-9764-EAC9E56C1D49}" type="datetimeFigureOut">
               <a:rPr lang="en-US" smtClean="0"/>
-              <a:t>10/16/2016</a:t>
+              <a:t>4/15/2018</a:t>
             </a:fld>
             <a:endParaRPr lang="en-US"/>
           </a:p>
@@ -2969,10 +2965,9 @@
           <a:lstStyle/>
           <a:p>
             <a:r>
-              <a:rPr lang="en-US" smtClean="0"/>
+              <a:rPr lang="en-US"/>
               <a:t>Click to edit Master title style</a:t>
             </a:r>
-            <a:endParaRPr lang="en-US"/>
           </a:p>
         </p:txBody>
       </p:sp>
@@ -3003,38 +2998,37 @@
           <a:p>
             <a:pPr lvl="0"/>
             <a:r>
-              <a:rPr lang="en-US" smtClean="0"/>
+              <a:rPr lang="en-US"/>
               <a:t>Click to edit Master text styles</a:t>
             </a:r>
           </a:p>
           <a:p>
             <a:pPr lvl="1"/>
             <a:r>
-              <a:rPr lang="en-US" smtClean="0"/>
+              <a:rPr lang="en-US"/>
               <a:t>Second level</a:t>
             </a:r>
           </a:p>
           <a:p>
             <a:pPr lvl="2"/>
             <a:r>
-              <a:rPr lang="en-US" smtClean="0"/>
+              <a:rPr lang="en-US"/>
               <a:t>Third level</a:t>
             </a:r>
           </a:p>
           <a:p>
             <a:pPr lvl="3"/>
             <a:r>
-              <a:rPr lang="en-US" smtClean="0"/>
+              <a:rPr lang="en-US"/>
               <a:t>Fourth level</a:t>
             </a:r>
           </a:p>
           <a:p>
             <a:pPr lvl="4"/>
             <a:r>
-              <a:rPr lang="en-US" smtClean="0"/>
+              <a:rPr lang="en-US"/>
               <a:t>Fifth level</a:t>
             </a:r>
-            <a:endParaRPr lang="en-US"/>
           </a:p>
         </p:txBody>
       </p:sp>
@@ -3073,7 +3067,7 @@
           <a:p>
             <a:fld id="{78C97017-6FC3-485B-9764-EAC9E56C1D49}" type="datetimeFigureOut">
               <a:rPr lang="en-US" smtClean="0"/>
-              <a:t>10/16/2016</a:t>
+              <a:t>4/15/2018</a:t>
             </a:fld>
             <a:endParaRPr lang="en-US"/>
           </a:p>
@@ -3510,8 +3504,8 @@
         </p:nvSpPr>
         <p:spPr>
           <a:xfrm flipH="1">
-            <a:off x="1964269" y="2191178"/>
-            <a:ext cx="609602" cy="1294917"/>
+            <a:off x="1895478" y="2819400"/>
+            <a:ext cx="609602" cy="823987"/>
           </a:xfrm>
           <a:prstGeom prst="roundRect">
             <a:avLst/>
@@ -3546,7 +3540,7 @@
           <a:p>
             <a:pPr algn="ctr"/>
             <a:r>
-              <a:rPr lang="en-US" sz="1600" dirty="0" smtClean="0">
+              <a:rPr lang="en-US" sz="1600" dirty="0">
                 <a:solidFill>
                   <a:schemeClr val="bg1"/>
                 </a:solidFill>
@@ -3605,7 +3599,7 @@
           <a:p>
             <a:pPr algn="ctr"/>
             <a:r>
-              <a:rPr lang="en-US" sz="1600" dirty="0" smtClean="0">
+              <a:rPr lang="en-US" sz="1600" dirty="0">
                 <a:solidFill>
                   <a:schemeClr val="bg1"/>
                 </a:solidFill>
@@ -3668,7 +3662,7 @@
           <a:p>
             <a:pPr algn="ctr"/>
             <a:r>
-              <a:rPr lang="en-US" sz="1600" dirty="0" smtClean="0">
+              <a:rPr lang="en-US" sz="1600" dirty="0">
                 <a:solidFill>
                   <a:schemeClr val="bg1"/>
                 </a:solidFill>
@@ -3727,7 +3721,7 @@
           <a:p>
             <a:pPr algn="ctr"/>
             <a:r>
-              <a:rPr lang="en-US" sz="1600" dirty="0" smtClean="0">
+              <a:rPr lang="en-US" sz="1600" dirty="0">
                 <a:solidFill>
                   <a:schemeClr val="bg1"/>
                 </a:solidFill>
@@ -3809,17 +3803,20 @@
         <p:nvCxnSpPr>
           <p:cNvPr id="10" name="Straight Arrow Connector 9"/>
           <p:cNvCxnSpPr>
+            <a:cxnSpLocks/>
             <a:endCxn id="3" idx="1"/>
           </p:cNvCxnSpPr>
           <p:nvPr/>
         </p:nvCxnSpPr>
         <p:spPr>
-          <a:xfrm>
-            <a:off x="2573871" y="2467189"/>
-            <a:ext cx="838198" cy="0"/>
-          </a:xfrm>
-          <a:prstGeom prst="straightConnector1">
-            <a:avLst/>
+          <a:xfrm flipV="1">
+            <a:off x="2361680" y="2467189"/>
+            <a:ext cx="1050389" cy="733211"/>
+          </a:xfrm>
+          <a:prstGeom prst="bentConnector3">
+            <a:avLst>
+              <a:gd name="adj1" fmla="val 71130"/>
+            </a:avLst>
           </a:prstGeom>
           <a:ln w="28575">
             <a:solidFill>
@@ -3846,13 +3843,15 @@
       <p:cxnSp>
         <p:nvCxnSpPr>
           <p:cNvPr id="12" name="Straight Arrow Connector 11"/>
-          <p:cNvCxnSpPr/>
+          <p:cNvCxnSpPr>
+            <a:cxnSpLocks/>
+          </p:cNvCxnSpPr>
           <p:nvPr/>
         </p:nvCxnSpPr>
         <p:spPr>
           <a:xfrm>
-            <a:off x="2569639" y="3276600"/>
-            <a:ext cx="838198" cy="0"/>
+            <a:off x="2490258" y="3486096"/>
+            <a:ext cx="917579" cy="1"/>
           </a:xfrm>
           <a:prstGeom prst="straightConnector1">
             <a:avLst/>
@@ -3962,7 +3961,7 @@
         </p:nvSpPr>
         <p:spPr>
           <a:xfrm>
-            <a:off x="1202269" y="2743200"/>
+            <a:off x="1202269" y="3200400"/>
             <a:ext cx="381000" cy="381000"/>
           </a:xfrm>
           <a:prstGeom prst="smileyFace">
@@ -4010,7 +4009,7 @@
         </p:nvCxnSpPr>
         <p:spPr>
           <a:xfrm flipV="1">
-            <a:off x="1636188" y="2939996"/>
+            <a:off x="1636188" y="3397196"/>
             <a:ext cx="273050" cy="1"/>
           </a:xfrm>
           <a:prstGeom prst="straightConnector1">
@@ -4182,7 +4181,7 @@
         </p:nvSpPr>
         <p:spPr>
           <a:xfrm>
-            <a:off x="2650069" y="1447800"/>
+            <a:off x="2818643" y="1365366"/>
             <a:ext cx="914400" cy="533400"/>
           </a:xfrm>
           <a:prstGeom prst="cloud">
@@ -4233,22 +4232,26 @@
         <p:nvCxnSpPr>
           <p:cNvPr id="52" name="Elbow Connector 51"/>
           <p:cNvCxnSpPr>
-            <a:stCxn id="2" idx="0"/>
+            <a:cxnSpLocks/>
+            <a:stCxn id="41" idx="0"/>
             <a:endCxn id="51" idx="2"/>
           </p:cNvCxnSpPr>
           <p:nvPr/>
         </p:nvCxnSpPr>
         <p:spPr>
           <a:xfrm rot="5400000" flipH="1" flipV="1">
-            <a:off x="2222648" y="1760922"/>
-            <a:ext cx="476678" cy="383835"/>
+            <a:off x="2371942" y="1682919"/>
+            <a:ext cx="500390" cy="398684"/>
           </a:xfrm>
           <a:prstGeom prst="bentConnector2">
             <a:avLst/>
           </a:prstGeom>
           <a:ln w="28575">
             <a:solidFill>
-              <a:srgbClr val="00B050"/>
+              <a:schemeClr val="tx1">
+                <a:lumMod val="65000"/>
+                <a:lumOff val="35000"/>
+              </a:schemeClr>
             </a:solidFill>
             <a:prstDash val="sysDot"/>
             <a:tailEnd type="arrow"/>
@@ -4269,65 +4272,6 @@
           </a:fontRef>
         </p:style>
       </p:cxnSp>
-      <p:sp>
-        <p:nvSpPr>
-          <p:cNvPr id="23" name="Rectangle 62"/>
-          <p:cNvSpPr/>
-          <p:nvPr/>
-        </p:nvSpPr>
-        <p:spPr>
-          <a:xfrm flipH="1">
-            <a:off x="1964269" y="3959459"/>
-            <a:ext cx="778931" cy="570908"/>
-          </a:xfrm>
-          <a:prstGeom prst="roundRect">
-            <a:avLst/>
-          </a:prstGeom>
-          <a:solidFill>
-            <a:srgbClr val="C00000"/>
-          </a:solidFill>
-          <a:ln w="19050">
-            <a:solidFill>
-              <a:srgbClr val="C00000"/>
-            </a:solidFill>
-          </a:ln>
-          <a:effectLst/>
-        </p:spPr>
-        <p:style>
-          <a:lnRef idx="1">
-            <a:schemeClr val="accent2"/>
-          </a:lnRef>
-          <a:fillRef idx="2">
-            <a:schemeClr val="accent2"/>
-          </a:fillRef>
-          <a:effectRef idx="1">
-            <a:schemeClr val="accent2"/>
-          </a:effectRef>
-          <a:fontRef idx="minor">
-            <a:schemeClr val="dk1"/>
-          </a:fontRef>
-        </p:style>
-        <p:txBody>
-          <a:bodyPr rtlCol="0" anchor="ctr"/>
-          <a:lstStyle/>
-          <a:p>
-            <a:pPr algn="ctr"/>
-            <a:r>
-              <a:rPr lang="en-US" sz="1600" dirty="0" smtClean="0">
-                <a:solidFill>
-                  <a:schemeClr val="bg1"/>
-                </a:solidFill>
-              </a:rPr>
-              <a:t>Main</a:t>
-            </a:r>
-            <a:endParaRPr lang="en-SG" sz="1600" dirty="0">
-              <a:solidFill>
-                <a:schemeClr val="bg1"/>
-              </a:solidFill>
-            </a:endParaRPr>
-          </a:p>
-        </p:txBody>
-      </p:sp>
       <p:cxnSp>
         <p:nvCxnSpPr>
           <p:cNvPr id="30" name="Straight Arrow Connector 29"/>
@@ -4455,7 +4399,7 @@
         </p:nvCxnSpPr>
         <p:spPr>
           <a:xfrm>
-            <a:off x="2743200" y="4244913"/>
+            <a:off x="2608246" y="4332876"/>
             <a:ext cx="249770" cy="0"/>
           </a:xfrm>
           <a:prstGeom prst="straightConnector1">
@@ -4484,80 +4428,160 @@
           </a:fontRef>
         </p:style>
       </p:cxnSp>
-      <p:cxnSp>
-        <p:nvCxnSpPr>
-          <p:cNvPr id="38" name="Straight Arrow Connector 37"/>
-          <p:cNvCxnSpPr/>
+      <p:grpSp>
+        <p:nvGrpSpPr>
+          <p:cNvPr id="14" name="Group 13">
+            <a:extLst>
+              <a:ext uri="{FF2B5EF4-FFF2-40B4-BE49-F238E27FC236}">
+                <a16:creationId xmlns:a16="http://schemas.microsoft.com/office/drawing/2014/main" id="{7984AD98-C4BD-44C9-AE93-48194945BDF3}"/>
+              </a:ext>
+            </a:extLst>
+          </p:cNvPr>
+          <p:cNvGrpSpPr/>
           <p:nvPr/>
-        </p:nvCxnSpPr>
-        <p:spPr>
-          <a:xfrm rot="13867188">
-            <a:off x="2743200" y="3755022"/>
-            <a:ext cx="0" cy="381000"/>
-          </a:xfrm>
-          <a:prstGeom prst="straightConnector1">
-            <a:avLst/>
-          </a:prstGeom>
-          <a:ln w="28575">
+        </p:nvGrpSpPr>
+        <p:grpSpPr>
+          <a:xfrm>
+            <a:off x="1829315" y="3785024"/>
+            <a:ext cx="969431" cy="833306"/>
+            <a:chOff x="1964269" y="3697061"/>
+            <a:chExt cx="969431" cy="833306"/>
+          </a:xfrm>
+        </p:grpSpPr>
+        <p:sp>
+          <p:nvSpPr>
+            <p:cNvPr id="23" name="Rectangle 62"/>
+            <p:cNvSpPr/>
+            <p:nvPr/>
+          </p:nvSpPr>
+          <p:spPr>
+            <a:xfrm flipH="1">
+              <a:off x="1964269" y="3959459"/>
+              <a:ext cx="778931" cy="570908"/>
+            </a:xfrm>
+            <a:prstGeom prst="roundRect">
+              <a:avLst/>
+            </a:prstGeom>
             <a:solidFill>
               <a:srgbClr val="C00000"/>
             </a:solidFill>
-            <a:prstDash val="solid"/>
-            <a:tailEnd type="arrow"/>
-          </a:ln>
-        </p:spPr>
-        <p:style>
-          <a:lnRef idx="1">
-            <a:schemeClr val="accent1"/>
-          </a:lnRef>
-          <a:fillRef idx="0">
-            <a:schemeClr val="accent1"/>
-          </a:fillRef>
-          <a:effectRef idx="0">
-            <a:schemeClr val="accent1"/>
-          </a:effectRef>
-          <a:fontRef idx="minor">
-            <a:schemeClr val="tx1"/>
-          </a:fontRef>
-        </p:style>
-      </p:cxnSp>
-      <p:cxnSp>
-        <p:nvCxnSpPr>
-          <p:cNvPr id="39" name="Straight Arrow Connector 38"/>
-          <p:cNvCxnSpPr/>
-          <p:nvPr/>
-        </p:nvCxnSpPr>
-        <p:spPr>
-          <a:xfrm flipV="1">
-            <a:off x="2353734" y="3697061"/>
-            <a:ext cx="0" cy="301859"/>
-          </a:xfrm>
-          <a:prstGeom prst="straightConnector1">
-            <a:avLst/>
-          </a:prstGeom>
-          <a:ln w="28575">
-            <a:solidFill>
-              <a:srgbClr val="C00000"/>
-            </a:solidFill>
-            <a:prstDash val="solid"/>
-            <a:tailEnd type="arrow"/>
-          </a:ln>
-        </p:spPr>
-        <p:style>
-          <a:lnRef idx="1">
-            <a:schemeClr val="accent1"/>
-          </a:lnRef>
-          <a:fillRef idx="0">
-            <a:schemeClr val="accent1"/>
-          </a:fillRef>
-          <a:effectRef idx="0">
-            <a:schemeClr val="accent1"/>
-          </a:effectRef>
-          <a:fontRef idx="minor">
-            <a:schemeClr val="tx1"/>
-          </a:fontRef>
-        </p:style>
-      </p:cxnSp>
+            <a:ln w="19050">
+              <a:solidFill>
+                <a:srgbClr val="C00000"/>
+              </a:solidFill>
+            </a:ln>
+            <a:effectLst/>
+          </p:spPr>
+          <p:style>
+            <a:lnRef idx="1">
+              <a:schemeClr val="accent2"/>
+            </a:lnRef>
+            <a:fillRef idx="2">
+              <a:schemeClr val="accent2"/>
+            </a:fillRef>
+            <a:effectRef idx="1">
+              <a:schemeClr val="accent2"/>
+            </a:effectRef>
+            <a:fontRef idx="minor">
+              <a:schemeClr val="dk1"/>
+            </a:fontRef>
+          </p:style>
+          <p:txBody>
+            <a:bodyPr rtlCol="0" anchor="ctr"/>
+            <a:lstStyle/>
+            <a:p>
+              <a:pPr algn="ctr"/>
+              <a:r>
+                <a:rPr lang="en-US" sz="1600" dirty="0">
+                  <a:solidFill>
+                    <a:schemeClr val="bg1"/>
+                  </a:solidFill>
+                </a:rPr>
+                <a:t>Main</a:t>
+              </a:r>
+              <a:endParaRPr lang="en-SG" sz="1600" dirty="0">
+                <a:solidFill>
+                  <a:schemeClr val="bg1"/>
+                </a:solidFill>
+              </a:endParaRPr>
+            </a:p>
+          </p:txBody>
+        </p:sp>
+        <p:cxnSp>
+          <p:nvCxnSpPr>
+            <p:cNvPr id="38" name="Straight Arrow Connector 37"/>
+            <p:cNvCxnSpPr/>
+            <p:nvPr/>
+          </p:nvCxnSpPr>
+          <p:spPr>
+            <a:xfrm rot="13867188">
+              <a:off x="2743200" y="3755022"/>
+              <a:ext cx="0" cy="381000"/>
+            </a:xfrm>
+            <a:prstGeom prst="straightConnector1">
+              <a:avLst/>
+            </a:prstGeom>
+            <a:ln w="28575">
+              <a:solidFill>
+                <a:srgbClr val="C00000"/>
+              </a:solidFill>
+              <a:prstDash val="solid"/>
+              <a:tailEnd type="arrow"/>
+            </a:ln>
+          </p:spPr>
+          <p:style>
+            <a:lnRef idx="1">
+              <a:schemeClr val="accent1"/>
+            </a:lnRef>
+            <a:fillRef idx="0">
+              <a:schemeClr val="accent1"/>
+            </a:fillRef>
+            <a:effectRef idx="0">
+              <a:schemeClr val="accent1"/>
+            </a:effectRef>
+            <a:fontRef idx="minor">
+              <a:schemeClr val="tx1"/>
+            </a:fontRef>
+          </p:style>
+        </p:cxnSp>
+        <p:cxnSp>
+          <p:nvCxnSpPr>
+            <p:cNvPr id="39" name="Straight Arrow Connector 38"/>
+            <p:cNvCxnSpPr/>
+            <p:nvPr/>
+          </p:nvCxnSpPr>
+          <p:spPr>
+            <a:xfrm flipV="1">
+              <a:off x="2353734" y="3697061"/>
+              <a:ext cx="0" cy="301859"/>
+            </a:xfrm>
+            <a:prstGeom prst="straightConnector1">
+              <a:avLst/>
+            </a:prstGeom>
+            <a:ln w="28575">
+              <a:solidFill>
+                <a:srgbClr val="C00000"/>
+              </a:solidFill>
+              <a:prstDash val="solid"/>
+              <a:tailEnd type="arrow"/>
+            </a:ln>
+          </p:spPr>
+          <p:style>
+            <a:lnRef idx="1">
+              <a:schemeClr val="accent1"/>
+            </a:lnRef>
+            <a:fillRef idx="0">
+              <a:schemeClr val="accent1"/>
+            </a:fillRef>
+            <a:effectRef idx="0">
+              <a:schemeClr val="accent1"/>
+            </a:effectRef>
+            <a:fontRef idx="minor">
+              <a:schemeClr val="tx1"/>
+            </a:fontRef>
+          </p:style>
+        </p:cxnSp>
+      </p:grpSp>
       <p:sp>
         <p:nvSpPr>
           <p:cNvPr id="6" name="Oval 5"/>
@@ -4664,7 +4688,7 @@
           <a:p>
             <a:pPr algn="ctr"/>
             <a:r>
-              <a:rPr lang="en-US" sz="1600" dirty="0" smtClean="0">
+              <a:rPr lang="en-US" sz="1600" dirty="0">
                 <a:solidFill>
                   <a:schemeClr val="bg1"/>
                 </a:solidFill>
@@ -4672,25 +4696,20 @@
               <a:t>Logs</a:t>
             </a:r>
             <a:br>
-              <a:rPr lang="en-US" sz="1600" dirty="0" smtClean="0">
+              <a:rPr lang="en-US" sz="1600" dirty="0">
                 <a:solidFill>
                   <a:schemeClr val="bg1"/>
                 </a:solidFill>
               </a:rPr>
             </a:br>
             <a:r>
-              <a:rPr lang="en-US" sz="1600" dirty="0" smtClean="0">
+              <a:rPr lang="en-US" sz="1600" dirty="0">
                 <a:solidFill>
                   <a:schemeClr val="bg1"/>
                 </a:solidFill>
               </a:rPr>
               <a:t>Center</a:t>
             </a:r>
-            <a:endParaRPr lang="en-US" sz="1600" dirty="0">
-              <a:solidFill>
-                <a:schemeClr val="bg1"/>
-              </a:solidFill>
-            </a:endParaRPr>
           </a:p>
         </p:txBody>
       </p:sp>
@@ -4756,6 +4775,123 @@
                 <a:lumMod val="75000"/>
               </a:schemeClr>
             </a:solidFill>
+          </a:ln>
+        </p:spPr>
+        <p:style>
+          <a:lnRef idx="1">
+            <a:schemeClr val="accent1"/>
+          </a:lnRef>
+          <a:fillRef idx="0">
+            <a:schemeClr val="accent1"/>
+          </a:fillRef>
+          <a:effectRef idx="0">
+            <a:schemeClr val="accent1"/>
+          </a:effectRef>
+          <a:fontRef idx="minor">
+            <a:schemeClr val="tx1"/>
+          </a:fontRef>
+        </p:style>
+      </p:cxnSp>
+      <p:sp>
+        <p:nvSpPr>
+          <p:cNvPr id="41" name="Rectangle 45">
+            <a:extLst>
+              <a:ext uri="{FF2B5EF4-FFF2-40B4-BE49-F238E27FC236}">
+                <a16:creationId xmlns:a16="http://schemas.microsoft.com/office/drawing/2014/main" id="{DDDDA62C-6AA7-4CD0-A98F-F630CE8B50C6}"/>
+              </a:ext>
+            </a:extLst>
+          </p:cNvPr>
+          <p:cNvSpPr/>
+          <p:nvPr/>
+        </p:nvSpPr>
+        <p:spPr>
+          <a:xfrm>
+            <a:off x="1890720" y="2132456"/>
+            <a:ext cx="1064149" cy="552022"/>
+          </a:xfrm>
+          <a:prstGeom prst="roundRect">
+            <a:avLst/>
+          </a:prstGeom>
+          <a:solidFill>
+            <a:schemeClr val="tx1">
+              <a:lumMod val="65000"/>
+              <a:lumOff val="35000"/>
+            </a:schemeClr>
+          </a:solidFill>
+          <a:ln w="19050">
+            <a:solidFill>
+              <a:schemeClr val="tx1">
+                <a:lumMod val="65000"/>
+                <a:lumOff val="35000"/>
+              </a:schemeClr>
+            </a:solidFill>
+          </a:ln>
+          <a:effectLst/>
+        </p:spPr>
+        <p:style>
+          <a:lnRef idx="1">
+            <a:schemeClr val="accent5"/>
+          </a:lnRef>
+          <a:fillRef idx="2">
+            <a:schemeClr val="accent5"/>
+          </a:fillRef>
+          <a:effectRef idx="1">
+            <a:schemeClr val="accent5"/>
+          </a:effectRef>
+          <a:fontRef idx="minor">
+            <a:schemeClr val="dk1"/>
+          </a:fontRef>
+        </p:style>
+        <p:txBody>
+          <a:bodyPr rtlCol="0" anchor="ctr"/>
+          <a:lstStyle/>
+          <a:p>
+            <a:pPr algn="ctr"/>
+            <a:r>
+              <a:rPr lang="en-US" sz="1600" dirty="0">
+                <a:solidFill>
+                  <a:schemeClr val="bg1"/>
+                </a:solidFill>
+              </a:rPr>
+              <a:t>Database</a:t>
+            </a:r>
+            <a:endParaRPr lang="en-SG" sz="1600" dirty="0">
+              <a:solidFill>
+                <a:schemeClr val="bg1"/>
+              </a:solidFill>
+            </a:endParaRPr>
+          </a:p>
+        </p:txBody>
+      </p:sp>
+      <p:cxnSp>
+        <p:nvCxnSpPr>
+          <p:cNvPr id="60" name="Straight Arrow Connector 9">
+            <a:extLst>
+              <a:ext uri="{FF2B5EF4-FFF2-40B4-BE49-F238E27FC236}">
+                <a16:creationId xmlns:a16="http://schemas.microsoft.com/office/drawing/2014/main" id="{8E055282-AD29-4A97-A0C2-90C6B8960594}"/>
+              </a:ext>
+            </a:extLst>
+          </p:cNvPr>
+          <p:cNvCxnSpPr>
+            <a:cxnSpLocks/>
+          </p:cNvCxnSpPr>
+          <p:nvPr/>
+        </p:nvCxnSpPr>
+        <p:spPr>
+          <a:xfrm rot="5400000" flipH="1" flipV="1">
+            <a:off x="2280297" y="2765862"/>
+            <a:ext cx="569100" cy="406332"/>
+          </a:xfrm>
+          <a:prstGeom prst="bentConnector3">
+            <a:avLst>
+              <a:gd name="adj1" fmla="val 50000"/>
+            </a:avLst>
+          </a:prstGeom>
+          <a:ln w="28575">
+            <a:solidFill>
+              <a:srgbClr val="00B050"/>
+            </a:solidFill>
+            <a:tailEnd type="arrow"/>
           </a:ln>
         </p:spPr>
         <p:style>

</xml_diff>